<commit_message>
Adding Lecture about creating an OSS proj
</commit_message>
<xml_diff>
--- a/notes/Lecture_05.pptx
+++ b/notes/Lecture_05.pptx
@@ -6,22 +6,34 @@
     <p:sldMasterId id="2147483777" r:id="rId2"/>
   </p:sldMasterIdLst>
   <p:notesMasterIdLst>
-    <p:notesMasterId r:id="rId13"/>
+    <p:notesMasterId r:id="rId25"/>
   </p:notesMasterIdLst>
   <p:handoutMasterIdLst>
-    <p:handoutMasterId r:id="rId14"/>
+    <p:handoutMasterId r:id="rId26"/>
   </p:handoutMasterIdLst>
   <p:sldIdLst>
     <p:sldId id="256" r:id="rId3"/>
     <p:sldId id="298" r:id="rId4"/>
     <p:sldId id="299" r:id="rId5"/>
-    <p:sldId id="301" r:id="rId6"/>
+    <p:sldId id="300" r:id="rId6"/>
     <p:sldId id="302" r:id="rId7"/>
-    <p:sldId id="300" r:id="rId8"/>
+    <p:sldId id="301" r:id="rId8"/>
     <p:sldId id="303" r:id="rId9"/>
     <p:sldId id="304" r:id="rId10"/>
-    <p:sldId id="306" r:id="rId11"/>
-    <p:sldId id="305" r:id="rId12"/>
+    <p:sldId id="305" r:id="rId11"/>
+    <p:sldId id="306" r:id="rId12"/>
+    <p:sldId id="307" r:id="rId13"/>
+    <p:sldId id="308" r:id="rId14"/>
+    <p:sldId id="309" r:id="rId15"/>
+    <p:sldId id="315" r:id="rId16"/>
+    <p:sldId id="310" r:id="rId17"/>
+    <p:sldId id="311" r:id="rId18"/>
+    <p:sldId id="312" r:id="rId19"/>
+    <p:sldId id="313" r:id="rId20"/>
+    <p:sldId id="314" r:id="rId21"/>
+    <p:sldId id="317" r:id="rId22"/>
+    <p:sldId id="316" r:id="rId23"/>
+    <p:sldId id="318" r:id="rId24"/>
   </p:sldIdLst>
   <p:sldSz cx="9144000" cy="6858000" type="screen4x3"/>
   <p:notesSz cx="7010400" cy="9296400"/>
@@ -11441,7 +11453,7 @@
           <a:p>
             <a:r>
               <a:rPr lang="en-US" dirty="0"/>
-              <a:t>Lecture #03: Code Review – Guidelines</a:t>
+              <a:t>Lecture #04: Creating an OSS project</a:t>
             </a:r>
           </a:p>
           <a:p>
@@ -11542,7 +11554,7 @@
           <p:cNvPr id="2" name="Title 1">
             <a:extLst>
               <a:ext uri="{FF2B5EF4-FFF2-40B4-BE49-F238E27FC236}">
-                <a16:creationId xmlns:a16="http://schemas.microsoft.com/office/drawing/2014/main" id="{EAB26B31-27BB-3249-A229-B1B041009745}"/>
+                <a16:creationId xmlns:a16="http://schemas.microsoft.com/office/drawing/2014/main" id="{E9ED9244-2750-5941-B1A5-9CA172748424}"/>
               </a:ext>
             </a:extLst>
           </p:cNvPr>
@@ -11560,7 +11572,7 @@
           <a:p>
             <a:r>
               <a:rPr lang="en-US" dirty="0"/>
-              <a:t>Let’s practice a Bit</a:t>
+              <a:t>Create Communication Means</a:t>
             </a:r>
           </a:p>
         </p:txBody>
@@ -11570,7 +11582,7 @@
           <p:cNvPr id="3" name="Content Placeholder 2">
             <a:extLst>
               <a:ext uri="{FF2B5EF4-FFF2-40B4-BE49-F238E27FC236}">
-                <a16:creationId xmlns:a16="http://schemas.microsoft.com/office/drawing/2014/main" id="{97A06293-70F7-B64B-8845-68CFC2149689}"/>
+                <a16:creationId xmlns:a16="http://schemas.microsoft.com/office/drawing/2014/main" id="{79330B93-2AC6-1145-8FBF-B3A63A1642EF}"/>
               </a:ext>
             </a:extLst>
           </p:cNvPr>
@@ -11589,36 +11601,67 @@
             <a:endParaRPr lang="en-US" dirty="0"/>
           </a:p>
           <a:p>
+            <a:r>
+              <a:rPr lang="en-US" dirty="0"/>
+              <a:t>More than the Issue Tracker</a:t>
+            </a:r>
+          </a:p>
+          <a:p>
             <a:endParaRPr lang="en-US" dirty="0"/>
           </a:p>
           <a:p>
             <a:r>
               <a:rPr lang="en-US" dirty="0"/>
-              <a:t>I will give you some code examples</a:t>
-            </a:r>
-          </a:p>
-          <a:p>
+              <a:t>Open Source is a collaborative endeavor</a:t>
+            </a:r>
+          </a:p>
+          <a:p>
+            <a:pPr lvl="1"/>
+            <a:r>
+              <a:rPr lang="en-US" dirty="0"/>
+              <a:t>Communication is key</a:t>
+            </a:r>
+          </a:p>
+          <a:p>
+            <a:pPr lvl="1"/>
             <a:endParaRPr lang="en-US" dirty="0"/>
           </a:p>
           <a:p>
             <a:r>
               <a:rPr lang="en-US" dirty="0"/>
-              <a:t>You will write the reviews for them</a:t>
-            </a:r>
-          </a:p>
-          <a:p>
+              <a:t>Extra ways to communicate are interesting	</a:t>
+            </a:r>
+          </a:p>
+          <a:p>
+            <a:pPr lvl="1"/>
+            <a:r>
+              <a:rPr lang="en-US" dirty="0"/>
+              <a:t>Slack, Discourse, IRC, mailing list</a:t>
+            </a:r>
+          </a:p>
+          <a:p>
+            <a:pPr lvl="1"/>
             <a:endParaRPr lang="en-US" dirty="0"/>
           </a:p>
           <a:p>
             <a:r>
               <a:rPr lang="en-US" dirty="0"/>
-              <a:t>We will discuss after </a:t>
-            </a:r>
-            <a:r>
-              <a:rPr lang="en-US"/>
-              <a:t>some minutes</a:t>
-            </a:r>
-            <a:endParaRPr lang="en-US" dirty="0"/>
+              <a:t>Challenge!!!!</a:t>
+            </a:r>
+          </a:p>
+          <a:p>
+            <a:pPr lvl="1"/>
+            <a:r>
+              <a:rPr lang="en-US" dirty="0"/>
+              <a:t>Answering </a:t>
+            </a:r>
+          </a:p>
+          <a:p>
+            <a:pPr lvl="1"/>
+            <a:r>
+              <a:rPr lang="en-US" dirty="0"/>
+              <a:t>Empty channels/quiet forums are demotivating</a:t>
+            </a:r>
           </a:p>
         </p:txBody>
       </p:sp>
@@ -11627,7 +11670,7 @@
           <p:cNvPr id="4" name="Slide Number Placeholder 3">
             <a:extLst>
               <a:ext uri="{FF2B5EF4-FFF2-40B4-BE49-F238E27FC236}">
-                <a16:creationId xmlns:a16="http://schemas.microsoft.com/office/drawing/2014/main" id="{CBCFEF06-8247-5043-97A3-54A0767CF5DC}"/>
+                <a16:creationId xmlns:a16="http://schemas.microsoft.com/office/drawing/2014/main" id="{CAB019C2-EEA8-9246-B04F-069C5E4FB4D3}"/>
               </a:ext>
             </a:extLst>
           </p:cNvPr>
@@ -11660,7 +11703,1566 @@
     </p:spTree>
     <p:extLst>
       <p:ext uri="{BB962C8B-B14F-4D97-AF65-F5344CB8AC3E}">
-        <p14:creationId xmlns:p14="http://schemas.microsoft.com/office/powerpoint/2010/main" val="2527445523"/>
+        <p14:creationId xmlns:p14="http://schemas.microsoft.com/office/powerpoint/2010/main" val="1527600554"/>
+      </p:ext>
+    </p:extLst>
+  </p:cSld>
+  <p:clrMapOvr>
+    <a:masterClrMapping/>
+  </p:clrMapOvr>
+</p:sld>
+</file>
+
+<file path=ppt/slides/slide11.xml><?xml version="1.0" encoding="utf-8"?>
+<p:sld xmlns:a="http://schemas.openxmlformats.org/drawingml/2006/main" xmlns:r="http://schemas.openxmlformats.org/officeDocument/2006/relationships" xmlns:p="http://schemas.openxmlformats.org/presentationml/2006/main">
+  <p:cSld>
+    <p:spTree>
+      <p:nvGrpSpPr>
+        <p:cNvPr id="1" name=""/>
+        <p:cNvGrpSpPr/>
+        <p:nvPr/>
+      </p:nvGrpSpPr>
+      <p:grpSpPr>
+        <a:xfrm>
+          <a:off x="0" y="0"/>
+          <a:ext cx="0" cy="0"/>
+          <a:chOff x="0" y="0"/>
+          <a:chExt cx="0" cy="0"/>
+        </a:xfrm>
+      </p:grpSpPr>
+      <p:sp>
+        <p:nvSpPr>
+          <p:cNvPr id="2" name="Title 1">
+            <a:extLst>
+              <a:ext uri="{FF2B5EF4-FFF2-40B4-BE49-F238E27FC236}">
+                <a16:creationId xmlns:a16="http://schemas.microsoft.com/office/drawing/2014/main" id="{45858BC2-9501-5244-8501-78A2CEE1EFC3}"/>
+              </a:ext>
+            </a:extLst>
+          </p:cNvPr>
+          <p:cNvSpPr>
+            <a:spLocks noGrp="1"/>
+          </p:cNvSpPr>
+          <p:nvPr>
+            <p:ph type="title"/>
+          </p:nvPr>
+        </p:nvSpPr>
+        <p:spPr/>
+        <p:txBody>
+          <a:bodyPr/>
+          <a:lstStyle/>
+          <a:p>
+            <a:r>
+              <a:rPr lang="en-US" dirty="0"/>
+              <a:t>Make It Easy to Contribute</a:t>
+            </a:r>
+          </a:p>
+        </p:txBody>
+      </p:sp>
+      <p:sp>
+        <p:nvSpPr>
+          <p:cNvPr id="3" name="Content Placeholder 2">
+            <a:extLst>
+              <a:ext uri="{FF2B5EF4-FFF2-40B4-BE49-F238E27FC236}">
+                <a16:creationId xmlns:a16="http://schemas.microsoft.com/office/drawing/2014/main" id="{17482E29-76CD-C842-A5D1-3F0F4C50C5F2}"/>
+              </a:ext>
+            </a:extLst>
+          </p:cNvPr>
+          <p:cNvSpPr>
+            <a:spLocks noGrp="1"/>
+          </p:cNvSpPr>
+          <p:nvPr>
+            <p:ph idx="1"/>
+          </p:nvPr>
+        </p:nvSpPr>
+        <p:spPr/>
+        <p:txBody>
+          <a:bodyPr/>
+          <a:lstStyle/>
+          <a:p>
+            <a:endParaRPr lang="en-US" dirty="0"/>
+          </a:p>
+          <a:p>
+            <a:r>
+              <a:rPr lang="en-US" dirty="0"/>
+              <a:t>Create a contribution (newcomer-friendly) page or portal</a:t>
+            </a:r>
+          </a:p>
+          <a:p>
+            <a:endParaRPr lang="en-US" dirty="0"/>
+          </a:p>
+          <a:p>
+            <a:r>
+              <a:rPr lang="en-US" dirty="0"/>
+              <a:t>What are the skills needed</a:t>
+            </a:r>
+          </a:p>
+          <a:p>
+            <a:endParaRPr lang="en-US" dirty="0"/>
+          </a:p>
+          <a:p>
+            <a:r>
+              <a:rPr lang="en-US" dirty="0"/>
+              <a:t>Structured documentation (see </a:t>
+            </a:r>
+            <a:r>
+              <a:rPr lang="en-US" dirty="0" err="1"/>
+              <a:t>flosscoach.com</a:t>
+            </a:r>
+            <a:r>
+              <a:rPr lang="en-US" dirty="0"/>
+              <a:t>)</a:t>
+            </a:r>
+          </a:p>
+          <a:p>
+            <a:endParaRPr lang="en-US" dirty="0"/>
+          </a:p>
+          <a:p>
+            <a:r>
+              <a:rPr lang="en-US" dirty="0"/>
+              <a:t>Give one tutorial-style example of how to do a common task</a:t>
+            </a:r>
+          </a:p>
+          <a:p>
+            <a:endParaRPr lang="en-US" dirty="0"/>
+          </a:p>
+          <a:p>
+            <a:r>
+              <a:rPr lang="en-US" dirty="0"/>
+              <a:t>Maintain a FAQ</a:t>
+            </a:r>
+          </a:p>
+          <a:p>
+            <a:endParaRPr lang="en-US" dirty="0"/>
+          </a:p>
+          <a:p>
+            <a:endParaRPr lang="en-US" dirty="0"/>
+          </a:p>
+          <a:p>
+            <a:endParaRPr lang="en-US" dirty="0"/>
+          </a:p>
+        </p:txBody>
+      </p:sp>
+      <p:sp>
+        <p:nvSpPr>
+          <p:cNvPr id="4" name="Slide Number Placeholder 3">
+            <a:extLst>
+              <a:ext uri="{FF2B5EF4-FFF2-40B4-BE49-F238E27FC236}">
+                <a16:creationId xmlns:a16="http://schemas.microsoft.com/office/drawing/2014/main" id="{FF27AABA-06F5-0048-ACD1-7C82E9AB1353}"/>
+              </a:ext>
+            </a:extLst>
+          </p:cNvPr>
+          <p:cNvSpPr>
+            <a:spLocks noGrp="1"/>
+          </p:cNvSpPr>
+          <p:nvPr>
+            <p:ph type="sldNum" sz="quarter" idx="12"/>
+          </p:nvPr>
+        </p:nvSpPr>
+        <p:spPr/>
+        <p:txBody>
+          <a:bodyPr/>
+          <a:lstStyle/>
+          <a:p>
+            <a:pPr>
+              <a:defRPr/>
+            </a:pPr>
+            <a:fld id="{3464530E-D695-45C9-AFB6-E411BBE0972A}" type="slidenum">
+              <a:rPr lang="en-US" smtClean="0"/>
+              <a:pPr>
+                <a:defRPr/>
+              </a:pPr>
+              <a:t>11</a:t>
+            </a:fld>
+            <a:endParaRPr lang="en-US"/>
+          </a:p>
+        </p:txBody>
+      </p:sp>
+    </p:spTree>
+    <p:extLst>
+      <p:ext uri="{BB962C8B-B14F-4D97-AF65-F5344CB8AC3E}">
+        <p14:creationId xmlns:p14="http://schemas.microsoft.com/office/powerpoint/2010/main" val="3380591430"/>
+      </p:ext>
+    </p:extLst>
+  </p:cSld>
+  <p:clrMapOvr>
+    <a:masterClrMapping/>
+  </p:clrMapOvr>
+</p:sld>
+</file>
+
+<file path=ppt/slides/slide12.xml><?xml version="1.0" encoding="utf-8"?>
+<p:sld xmlns:a="http://schemas.openxmlformats.org/drawingml/2006/main" xmlns:r="http://schemas.openxmlformats.org/officeDocument/2006/relationships" xmlns:p="http://schemas.openxmlformats.org/presentationml/2006/main">
+  <p:cSld>
+    <p:spTree>
+      <p:nvGrpSpPr>
+        <p:cNvPr id="1" name=""/>
+        <p:cNvGrpSpPr/>
+        <p:nvPr/>
+      </p:nvGrpSpPr>
+      <p:grpSpPr>
+        <a:xfrm>
+          <a:off x="0" y="0"/>
+          <a:ext cx="0" cy="0"/>
+          <a:chOff x="0" y="0"/>
+          <a:chExt cx="0" cy="0"/>
+        </a:xfrm>
+      </p:grpSpPr>
+      <p:sp>
+        <p:nvSpPr>
+          <p:cNvPr id="2" name="Title 1">
+            <a:extLst>
+              <a:ext uri="{FF2B5EF4-FFF2-40B4-BE49-F238E27FC236}">
+                <a16:creationId xmlns:a16="http://schemas.microsoft.com/office/drawing/2014/main" id="{45858BC2-9501-5244-8501-78A2CEE1EFC3}"/>
+              </a:ext>
+            </a:extLst>
+          </p:cNvPr>
+          <p:cNvSpPr>
+            <a:spLocks noGrp="1"/>
+          </p:cNvSpPr>
+          <p:nvPr>
+            <p:ph type="title"/>
+          </p:nvPr>
+        </p:nvSpPr>
+        <p:spPr/>
+        <p:txBody>
+          <a:bodyPr/>
+          <a:lstStyle/>
+          <a:p>
+            <a:r>
+              <a:rPr lang="en-US" dirty="0"/>
+              <a:t>Make It Easy to Contribute</a:t>
+            </a:r>
+          </a:p>
+        </p:txBody>
+      </p:sp>
+      <p:sp>
+        <p:nvSpPr>
+          <p:cNvPr id="3" name="Content Placeholder 2">
+            <a:extLst>
+              <a:ext uri="{FF2B5EF4-FFF2-40B4-BE49-F238E27FC236}">
+                <a16:creationId xmlns:a16="http://schemas.microsoft.com/office/drawing/2014/main" id="{17482E29-76CD-C842-A5D1-3F0F4C50C5F2}"/>
+              </a:ext>
+            </a:extLst>
+          </p:cNvPr>
+          <p:cNvSpPr>
+            <a:spLocks noGrp="1"/>
+          </p:cNvSpPr>
+          <p:nvPr>
+            <p:ph idx="1"/>
+          </p:nvPr>
+        </p:nvSpPr>
+        <p:spPr/>
+        <p:txBody>
+          <a:bodyPr/>
+          <a:lstStyle/>
+          <a:p>
+            <a:r>
+              <a:rPr lang="en-US" dirty="0"/>
+              <a:t>Create a contribution (newcomer-friendly) page or portal</a:t>
+            </a:r>
+          </a:p>
+          <a:p>
+            <a:endParaRPr lang="en-US" dirty="0"/>
+          </a:p>
+          <a:p>
+            <a:r>
+              <a:rPr lang="en-US" dirty="0"/>
+              <a:t>Identify and/or dismiss outdated information</a:t>
+            </a:r>
+          </a:p>
+          <a:p>
+            <a:endParaRPr lang="en-US" dirty="0"/>
+          </a:p>
+          <a:p>
+            <a:r>
+              <a:rPr lang="en-US" dirty="0"/>
+              <a:t>Point newcomers to easy tasks</a:t>
+            </a:r>
+          </a:p>
+          <a:p>
+            <a:endParaRPr lang="en-US" dirty="0"/>
+          </a:p>
+          <a:p>
+            <a:r>
+              <a:rPr lang="en-US" dirty="0"/>
+              <a:t>Keep the issue list up-to-date</a:t>
+            </a:r>
+          </a:p>
+          <a:p>
+            <a:endParaRPr lang="en-US" dirty="0"/>
+          </a:p>
+          <a:p>
+            <a:r>
+              <a:rPr lang="en-US" dirty="0"/>
+              <a:t>Make it easy for newcomers to build the system locally</a:t>
+            </a:r>
+          </a:p>
+          <a:p>
+            <a:endParaRPr lang="en-US" dirty="0"/>
+          </a:p>
+          <a:p>
+            <a:r>
+              <a:rPr lang="en-US" dirty="0"/>
+              <a:t>Document the code structure</a:t>
+            </a:r>
+          </a:p>
+          <a:p>
+            <a:endParaRPr lang="en-US" dirty="0"/>
+          </a:p>
+          <a:p>
+            <a:endParaRPr lang="en-US" dirty="0"/>
+          </a:p>
+          <a:p>
+            <a:endParaRPr lang="en-US" dirty="0"/>
+          </a:p>
+        </p:txBody>
+      </p:sp>
+      <p:sp>
+        <p:nvSpPr>
+          <p:cNvPr id="4" name="Slide Number Placeholder 3">
+            <a:extLst>
+              <a:ext uri="{FF2B5EF4-FFF2-40B4-BE49-F238E27FC236}">
+                <a16:creationId xmlns:a16="http://schemas.microsoft.com/office/drawing/2014/main" id="{FF27AABA-06F5-0048-ACD1-7C82E9AB1353}"/>
+              </a:ext>
+            </a:extLst>
+          </p:cNvPr>
+          <p:cNvSpPr>
+            <a:spLocks noGrp="1"/>
+          </p:cNvSpPr>
+          <p:nvPr>
+            <p:ph type="sldNum" sz="quarter" idx="12"/>
+          </p:nvPr>
+        </p:nvSpPr>
+        <p:spPr/>
+        <p:txBody>
+          <a:bodyPr/>
+          <a:lstStyle/>
+          <a:p>
+            <a:pPr>
+              <a:defRPr/>
+            </a:pPr>
+            <a:fld id="{3464530E-D695-45C9-AFB6-E411BBE0972A}" type="slidenum">
+              <a:rPr lang="en-US" smtClean="0"/>
+              <a:pPr>
+                <a:defRPr/>
+              </a:pPr>
+              <a:t>12</a:t>
+            </a:fld>
+            <a:endParaRPr lang="en-US"/>
+          </a:p>
+        </p:txBody>
+      </p:sp>
+    </p:spTree>
+    <p:extLst>
+      <p:ext uri="{BB962C8B-B14F-4D97-AF65-F5344CB8AC3E}">
+        <p14:creationId xmlns:p14="http://schemas.microsoft.com/office/powerpoint/2010/main" val="2276977144"/>
+      </p:ext>
+    </p:extLst>
+  </p:cSld>
+  <p:clrMapOvr>
+    <a:masterClrMapping/>
+  </p:clrMapOvr>
+</p:sld>
+</file>
+
+<file path=ppt/slides/slide13.xml><?xml version="1.0" encoding="utf-8"?>
+<p:sld xmlns:a="http://schemas.openxmlformats.org/drawingml/2006/main" xmlns:r="http://schemas.openxmlformats.org/officeDocument/2006/relationships" xmlns:p="http://schemas.openxmlformats.org/presentationml/2006/main">
+  <p:cSld>
+    <p:spTree>
+      <p:nvGrpSpPr>
+        <p:cNvPr id="1" name=""/>
+        <p:cNvGrpSpPr/>
+        <p:nvPr/>
+      </p:nvGrpSpPr>
+      <p:grpSpPr>
+        <a:xfrm>
+          <a:off x="0" y="0"/>
+          <a:ext cx="0" cy="0"/>
+          <a:chOff x="0" y="0"/>
+          <a:chExt cx="0" cy="0"/>
+        </a:xfrm>
+      </p:grpSpPr>
+      <p:sp>
+        <p:nvSpPr>
+          <p:cNvPr id="2" name="Title 1">
+            <a:extLst>
+              <a:ext uri="{FF2B5EF4-FFF2-40B4-BE49-F238E27FC236}">
+                <a16:creationId xmlns:a16="http://schemas.microsoft.com/office/drawing/2014/main" id="{F8E4B553-1CC0-8340-9920-078480DCFD18}"/>
+              </a:ext>
+            </a:extLst>
+          </p:cNvPr>
+          <p:cNvSpPr>
+            <a:spLocks noGrp="1"/>
+          </p:cNvSpPr>
+          <p:nvPr>
+            <p:ph type="title"/>
+          </p:nvPr>
+        </p:nvSpPr>
+        <p:spPr/>
+        <p:txBody>
+          <a:bodyPr/>
+          <a:lstStyle/>
+          <a:p>
+            <a:r>
+              <a:rPr lang="en-US" dirty="0"/>
+              <a:t>How?!?</a:t>
+            </a:r>
+          </a:p>
+        </p:txBody>
+      </p:sp>
+      <p:sp>
+        <p:nvSpPr>
+          <p:cNvPr id="4" name="Slide Number Placeholder 3">
+            <a:extLst>
+              <a:ext uri="{FF2B5EF4-FFF2-40B4-BE49-F238E27FC236}">
+                <a16:creationId xmlns:a16="http://schemas.microsoft.com/office/drawing/2014/main" id="{C82D67AE-5A1D-2E46-884C-28618F8EE4D2}"/>
+              </a:ext>
+            </a:extLst>
+          </p:cNvPr>
+          <p:cNvSpPr>
+            <a:spLocks noGrp="1"/>
+          </p:cNvSpPr>
+          <p:nvPr>
+            <p:ph type="sldNum" sz="quarter" idx="12"/>
+          </p:nvPr>
+        </p:nvSpPr>
+        <p:spPr/>
+        <p:txBody>
+          <a:bodyPr/>
+          <a:lstStyle/>
+          <a:p>
+            <a:pPr>
+              <a:defRPr/>
+            </a:pPr>
+            <a:fld id="{3464530E-D695-45C9-AFB6-E411BBE0972A}" type="slidenum">
+              <a:rPr lang="en-US" smtClean="0"/>
+              <a:pPr>
+                <a:defRPr/>
+              </a:pPr>
+              <a:t>13</a:t>
+            </a:fld>
+            <a:endParaRPr lang="en-US"/>
+          </a:p>
+        </p:txBody>
+      </p:sp>
+      <p:pic>
+        <p:nvPicPr>
+          <p:cNvPr id="5" name="Picture 4">
+            <a:extLst>
+              <a:ext uri="{FF2B5EF4-FFF2-40B4-BE49-F238E27FC236}">
+                <a16:creationId xmlns:a16="http://schemas.microsoft.com/office/drawing/2014/main" id="{2CDAEB54-39FA-574A-A392-3B7963C8B002}"/>
+              </a:ext>
+            </a:extLst>
+          </p:cNvPr>
+          <p:cNvPicPr>
+            <a:picLocks noChangeAspect="1"/>
+          </p:cNvPicPr>
+          <p:nvPr/>
+        </p:nvPicPr>
+        <p:blipFill>
+          <a:blip r:embed="rId2"/>
+          <a:stretch>
+            <a:fillRect/>
+          </a:stretch>
+        </p:blipFill>
+        <p:spPr>
+          <a:xfrm>
+            <a:off x="1825090" y="1137887"/>
+            <a:ext cx="6074310" cy="5089490"/>
+          </a:xfrm>
+          <a:prstGeom prst="rect">
+            <a:avLst/>
+          </a:prstGeom>
+        </p:spPr>
+      </p:pic>
+      <p:sp>
+        <p:nvSpPr>
+          <p:cNvPr id="3" name="Content Placeholder 2">
+            <a:extLst>
+              <a:ext uri="{FF2B5EF4-FFF2-40B4-BE49-F238E27FC236}">
+                <a16:creationId xmlns:a16="http://schemas.microsoft.com/office/drawing/2014/main" id="{D48074A5-C7D0-F64A-8E30-8898DDC38442}"/>
+              </a:ext>
+            </a:extLst>
+          </p:cNvPr>
+          <p:cNvSpPr>
+            <a:spLocks noGrp="1"/>
+          </p:cNvSpPr>
+          <p:nvPr>
+            <p:ph idx="1"/>
+          </p:nvPr>
+        </p:nvSpPr>
+        <p:spPr>
+          <a:xfrm>
+            <a:off x="241300" y="5854700"/>
+            <a:ext cx="8305800" cy="543016"/>
+          </a:xfrm>
+        </p:spPr>
+        <p:txBody>
+          <a:bodyPr/>
+          <a:lstStyle/>
+          <a:p>
+            <a:r>
+              <a:rPr lang="en-US" dirty="0"/>
+              <a:t>https://</a:t>
+            </a:r>
+            <a:r>
+              <a:rPr lang="en-US" dirty="0" err="1"/>
+              <a:t>opensource.guide</a:t>
+            </a:r>
+            <a:r>
+              <a:rPr lang="en-US" dirty="0"/>
+              <a:t>/starting-a-project/</a:t>
+            </a:r>
+          </a:p>
+        </p:txBody>
+      </p:sp>
+    </p:spTree>
+    <p:extLst>
+      <p:ext uri="{BB962C8B-B14F-4D97-AF65-F5344CB8AC3E}">
+        <p14:creationId xmlns:p14="http://schemas.microsoft.com/office/powerpoint/2010/main" val="1398337464"/>
+      </p:ext>
+    </p:extLst>
+  </p:cSld>
+  <p:clrMapOvr>
+    <a:masterClrMapping/>
+  </p:clrMapOvr>
+</p:sld>
+</file>
+
+<file path=ppt/slides/slide14.xml><?xml version="1.0" encoding="utf-8"?>
+<p:sld xmlns:a="http://schemas.openxmlformats.org/drawingml/2006/main" xmlns:r="http://schemas.openxmlformats.org/officeDocument/2006/relationships" xmlns:p="http://schemas.openxmlformats.org/presentationml/2006/main">
+  <p:cSld>
+    <p:spTree>
+      <p:nvGrpSpPr>
+        <p:cNvPr id="1" name=""/>
+        <p:cNvGrpSpPr/>
+        <p:nvPr/>
+      </p:nvGrpSpPr>
+      <p:grpSpPr>
+        <a:xfrm>
+          <a:off x="0" y="0"/>
+          <a:ext cx="0" cy="0"/>
+          <a:chOff x="0" y="0"/>
+          <a:chExt cx="0" cy="0"/>
+        </a:xfrm>
+      </p:grpSpPr>
+      <p:sp>
+        <p:nvSpPr>
+          <p:cNvPr id="2" name="Title 1">
+            <a:extLst>
+              <a:ext uri="{FF2B5EF4-FFF2-40B4-BE49-F238E27FC236}">
+                <a16:creationId xmlns:a16="http://schemas.microsoft.com/office/drawing/2014/main" id="{5B6CE49B-E393-944E-84E5-FC52ADE27D7A}"/>
+              </a:ext>
+            </a:extLst>
+          </p:cNvPr>
+          <p:cNvSpPr>
+            <a:spLocks noGrp="1"/>
+          </p:cNvSpPr>
+          <p:nvPr>
+            <p:ph type="title"/>
+          </p:nvPr>
+        </p:nvSpPr>
+        <p:spPr/>
+        <p:txBody>
+          <a:bodyPr/>
+          <a:lstStyle/>
+          <a:p>
+            <a:r>
+              <a:rPr lang="en-US" dirty="0"/>
+              <a:t>How?</a:t>
+            </a:r>
+          </a:p>
+        </p:txBody>
+      </p:sp>
+      <p:sp>
+        <p:nvSpPr>
+          <p:cNvPr id="3" name="Content Placeholder 2">
+            <a:extLst>
+              <a:ext uri="{FF2B5EF4-FFF2-40B4-BE49-F238E27FC236}">
+                <a16:creationId xmlns:a16="http://schemas.microsoft.com/office/drawing/2014/main" id="{F13F6739-2CCF-7A49-86D7-010B14E5CBC0}"/>
+              </a:ext>
+            </a:extLst>
+          </p:cNvPr>
+          <p:cNvSpPr>
+            <a:spLocks noGrp="1"/>
+          </p:cNvSpPr>
+          <p:nvPr>
+            <p:ph idx="1"/>
+          </p:nvPr>
+        </p:nvSpPr>
+        <p:spPr/>
+        <p:txBody>
+          <a:bodyPr/>
+          <a:lstStyle/>
+          <a:p>
+            <a:endParaRPr lang="en-US"/>
+          </a:p>
+        </p:txBody>
+      </p:sp>
+      <p:sp>
+        <p:nvSpPr>
+          <p:cNvPr id="4" name="Slide Number Placeholder 3">
+            <a:extLst>
+              <a:ext uri="{FF2B5EF4-FFF2-40B4-BE49-F238E27FC236}">
+                <a16:creationId xmlns:a16="http://schemas.microsoft.com/office/drawing/2014/main" id="{86FFDEF9-E77D-DF4D-ACB4-7674D28EA2DF}"/>
+              </a:ext>
+            </a:extLst>
+          </p:cNvPr>
+          <p:cNvSpPr>
+            <a:spLocks noGrp="1"/>
+          </p:cNvSpPr>
+          <p:nvPr>
+            <p:ph type="sldNum" sz="quarter" idx="12"/>
+          </p:nvPr>
+        </p:nvSpPr>
+        <p:spPr/>
+        <p:txBody>
+          <a:bodyPr/>
+          <a:lstStyle/>
+          <a:p>
+            <a:pPr>
+              <a:defRPr/>
+            </a:pPr>
+            <a:fld id="{3464530E-D695-45C9-AFB6-E411BBE0972A}" type="slidenum">
+              <a:rPr lang="en-US" smtClean="0"/>
+              <a:pPr>
+                <a:defRPr/>
+              </a:pPr>
+              <a:t>14</a:t>
+            </a:fld>
+            <a:endParaRPr lang="en-US"/>
+          </a:p>
+        </p:txBody>
+      </p:sp>
+      <p:pic>
+        <p:nvPicPr>
+          <p:cNvPr id="5" name="Picture 4">
+            <a:extLst>
+              <a:ext uri="{FF2B5EF4-FFF2-40B4-BE49-F238E27FC236}">
+                <a16:creationId xmlns:a16="http://schemas.microsoft.com/office/drawing/2014/main" id="{72426D73-4884-BD40-8C1D-05FE8706D502}"/>
+              </a:ext>
+            </a:extLst>
+          </p:cNvPr>
+          <p:cNvPicPr>
+            <a:picLocks noChangeAspect="1"/>
+          </p:cNvPicPr>
+          <p:nvPr/>
+        </p:nvPicPr>
+        <p:blipFill rotWithShape="1">
+          <a:blip r:embed="rId2"/>
+          <a:srcRect l="24503" t="2413" b="2302"/>
+          <a:stretch/>
+        </p:blipFill>
+        <p:spPr>
+          <a:xfrm>
+            <a:off x="0" y="0"/>
+            <a:ext cx="9144000" cy="6832600"/>
+          </a:xfrm>
+          <a:prstGeom prst="rect">
+            <a:avLst/>
+          </a:prstGeom>
+        </p:spPr>
+      </p:pic>
+    </p:spTree>
+    <p:extLst>
+      <p:ext uri="{BB962C8B-B14F-4D97-AF65-F5344CB8AC3E}">
+        <p14:creationId xmlns:p14="http://schemas.microsoft.com/office/powerpoint/2010/main" val="682472184"/>
+      </p:ext>
+    </p:extLst>
+  </p:cSld>
+  <p:clrMapOvr>
+    <a:masterClrMapping/>
+  </p:clrMapOvr>
+</p:sld>
+</file>
+
+<file path=ppt/slides/slide15.xml><?xml version="1.0" encoding="utf-8"?>
+<p:sld xmlns:a="http://schemas.openxmlformats.org/drawingml/2006/main" xmlns:r="http://schemas.openxmlformats.org/officeDocument/2006/relationships" xmlns:p="http://schemas.openxmlformats.org/presentationml/2006/main">
+  <p:cSld>
+    <p:spTree>
+      <p:nvGrpSpPr>
+        <p:cNvPr id="1" name=""/>
+        <p:cNvGrpSpPr/>
+        <p:nvPr/>
+      </p:nvGrpSpPr>
+      <p:grpSpPr>
+        <a:xfrm>
+          <a:off x="0" y="0"/>
+          <a:ext cx="0" cy="0"/>
+          <a:chOff x="0" y="0"/>
+          <a:chExt cx="0" cy="0"/>
+        </a:xfrm>
+      </p:grpSpPr>
+      <p:sp>
+        <p:nvSpPr>
+          <p:cNvPr id="2" name="Title 1">
+            <a:extLst>
+              <a:ext uri="{FF2B5EF4-FFF2-40B4-BE49-F238E27FC236}">
+                <a16:creationId xmlns:a16="http://schemas.microsoft.com/office/drawing/2014/main" id="{962709C2-3FA4-184A-9F5A-B35D953D1B35}"/>
+              </a:ext>
+            </a:extLst>
+          </p:cNvPr>
+          <p:cNvSpPr>
+            <a:spLocks noGrp="1"/>
+          </p:cNvSpPr>
+          <p:nvPr>
+            <p:ph type="title"/>
+          </p:nvPr>
+        </p:nvSpPr>
+        <p:spPr/>
+        <p:txBody>
+          <a:bodyPr/>
+          <a:lstStyle/>
+          <a:p>
+            <a:r>
+              <a:rPr lang="en-US" dirty="0"/>
+              <a:t>README File</a:t>
+            </a:r>
+          </a:p>
+        </p:txBody>
+      </p:sp>
+      <p:sp>
+        <p:nvSpPr>
+          <p:cNvPr id="3" name="Content Placeholder 2">
+            <a:extLst>
+              <a:ext uri="{FF2B5EF4-FFF2-40B4-BE49-F238E27FC236}">
+                <a16:creationId xmlns:a16="http://schemas.microsoft.com/office/drawing/2014/main" id="{C5D96796-FD46-1C4E-92D9-14682E05A9A9}"/>
+              </a:ext>
+            </a:extLst>
+          </p:cNvPr>
+          <p:cNvSpPr>
+            <a:spLocks noGrp="1"/>
+          </p:cNvSpPr>
+          <p:nvPr>
+            <p:ph idx="1"/>
+          </p:nvPr>
+        </p:nvSpPr>
+        <p:spPr/>
+        <p:txBody>
+          <a:bodyPr/>
+          <a:lstStyle/>
+          <a:p>
+            <a:r>
+              <a:rPr lang="en-US" dirty="0"/>
+              <a:t>What does this project do?</a:t>
+            </a:r>
+          </a:p>
+          <a:p>
+            <a:endParaRPr lang="en-US" dirty="0"/>
+          </a:p>
+          <a:p>
+            <a:r>
+              <a:rPr lang="en-US" dirty="0"/>
+              <a:t>Why is this project useful?</a:t>
+            </a:r>
+          </a:p>
+          <a:p>
+            <a:endParaRPr lang="en-US" dirty="0"/>
+          </a:p>
+          <a:p>
+            <a:r>
+              <a:rPr lang="en-US" dirty="0"/>
+              <a:t>How do I get started?</a:t>
+            </a:r>
+          </a:p>
+          <a:p>
+            <a:endParaRPr lang="en-US" dirty="0"/>
+          </a:p>
+          <a:p>
+            <a:r>
+              <a:rPr lang="en-US" dirty="0"/>
+              <a:t>Where can I get more help, if I need it?</a:t>
+            </a:r>
+          </a:p>
+          <a:p>
+            <a:endParaRPr lang="en-US" dirty="0"/>
+          </a:p>
+          <a:p>
+            <a:r>
+              <a:rPr lang="en-US" dirty="0"/>
+              <a:t>How you handle contributions, </a:t>
+            </a:r>
+          </a:p>
+          <a:p>
+            <a:endParaRPr lang="en-US" dirty="0"/>
+          </a:p>
+          <a:p>
+            <a:r>
+              <a:rPr lang="en-US" dirty="0"/>
+              <a:t>What are the goals of the project?</a:t>
+            </a:r>
+          </a:p>
+        </p:txBody>
+      </p:sp>
+      <p:sp>
+        <p:nvSpPr>
+          <p:cNvPr id="4" name="Slide Number Placeholder 3">
+            <a:extLst>
+              <a:ext uri="{FF2B5EF4-FFF2-40B4-BE49-F238E27FC236}">
+                <a16:creationId xmlns:a16="http://schemas.microsoft.com/office/drawing/2014/main" id="{D8972F57-94FA-7941-B944-DE5B86617347}"/>
+              </a:ext>
+            </a:extLst>
+          </p:cNvPr>
+          <p:cNvSpPr>
+            <a:spLocks noGrp="1"/>
+          </p:cNvSpPr>
+          <p:nvPr>
+            <p:ph type="sldNum" sz="quarter" idx="12"/>
+          </p:nvPr>
+        </p:nvSpPr>
+        <p:spPr/>
+        <p:txBody>
+          <a:bodyPr/>
+          <a:lstStyle/>
+          <a:p>
+            <a:pPr>
+              <a:defRPr/>
+            </a:pPr>
+            <a:fld id="{3464530E-D695-45C9-AFB6-E411BBE0972A}" type="slidenum">
+              <a:rPr lang="en-US" smtClean="0"/>
+              <a:pPr>
+                <a:defRPr/>
+              </a:pPr>
+              <a:t>15</a:t>
+            </a:fld>
+            <a:endParaRPr lang="en-US"/>
+          </a:p>
+        </p:txBody>
+      </p:sp>
+    </p:spTree>
+    <p:extLst>
+      <p:ext uri="{BB962C8B-B14F-4D97-AF65-F5344CB8AC3E}">
+        <p14:creationId xmlns:p14="http://schemas.microsoft.com/office/powerpoint/2010/main" val="2837656785"/>
+      </p:ext>
+    </p:extLst>
+  </p:cSld>
+  <p:clrMapOvr>
+    <a:masterClrMapping/>
+  </p:clrMapOvr>
+</p:sld>
+</file>
+
+<file path=ppt/slides/slide16.xml><?xml version="1.0" encoding="utf-8"?>
+<p:sld xmlns:a="http://schemas.openxmlformats.org/drawingml/2006/main" xmlns:r="http://schemas.openxmlformats.org/officeDocument/2006/relationships" xmlns:p="http://schemas.openxmlformats.org/presentationml/2006/main">
+  <p:cSld>
+    <p:spTree>
+      <p:nvGrpSpPr>
+        <p:cNvPr id="1" name=""/>
+        <p:cNvGrpSpPr/>
+        <p:nvPr/>
+      </p:nvGrpSpPr>
+      <p:grpSpPr>
+        <a:xfrm>
+          <a:off x="0" y="0"/>
+          <a:ext cx="0" cy="0"/>
+          <a:chOff x="0" y="0"/>
+          <a:chExt cx="0" cy="0"/>
+        </a:xfrm>
+      </p:grpSpPr>
+      <p:sp>
+        <p:nvSpPr>
+          <p:cNvPr id="2" name="Title 1">
+            <a:extLst>
+              <a:ext uri="{FF2B5EF4-FFF2-40B4-BE49-F238E27FC236}">
+                <a16:creationId xmlns:a16="http://schemas.microsoft.com/office/drawing/2014/main" id="{9C076415-D0E6-2244-AB54-C9A7DFCDD0C4}"/>
+              </a:ext>
+            </a:extLst>
+          </p:cNvPr>
+          <p:cNvSpPr>
+            <a:spLocks noGrp="1"/>
+          </p:cNvSpPr>
+          <p:nvPr>
+            <p:ph type="title"/>
+          </p:nvPr>
+        </p:nvSpPr>
+        <p:spPr/>
+        <p:txBody>
+          <a:bodyPr/>
+          <a:lstStyle/>
+          <a:p>
+            <a:r>
+              <a:rPr lang="en-US" dirty="0"/>
+              <a:t>README File</a:t>
+            </a:r>
+          </a:p>
+        </p:txBody>
+      </p:sp>
+      <p:sp>
+        <p:nvSpPr>
+          <p:cNvPr id="3" name="Content Placeholder 2">
+            <a:extLst>
+              <a:ext uri="{FF2B5EF4-FFF2-40B4-BE49-F238E27FC236}">
+                <a16:creationId xmlns:a16="http://schemas.microsoft.com/office/drawing/2014/main" id="{49098F4F-75C5-5843-988D-FEAA9117D587}"/>
+              </a:ext>
+            </a:extLst>
+          </p:cNvPr>
+          <p:cNvSpPr>
+            <a:spLocks noGrp="1"/>
+          </p:cNvSpPr>
+          <p:nvPr>
+            <p:ph idx="1"/>
+          </p:nvPr>
+        </p:nvSpPr>
+        <p:spPr/>
+        <p:txBody>
+          <a:bodyPr/>
+          <a:lstStyle/>
+          <a:p>
+            <a:endParaRPr lang="en-US" dirty="0"/>
+          </a:p>
+          <a:p>
+            <a:endParaRPr lang="en-US" dirty="0"/>
+          </a:p>
+        </p:txBody>
+      </p:sp>
+      <p:sp>
+        <p:nvSpPr>
+          <p:cNvPr id="4" name="Slide Number Placeholder 3">
+            <a:extLst>
+              <a:ext uri="{FF2B5EF4-FFF2-40B4-BE49-F238E27FC236}">
+                <a16:creationId xmlns:a16="http://schemas.microsoft.com/office/drawing/2014/main" id="{26F5A9D3-25BD-B448-941E-6B47DFD4ACFB}"/>
+              </a:ext>
+            </a:extLst>
+          </p:cNvPr>
+          <p:cNvSpPr>
+            <a:spLocks noGrp="1"/>
+          </p:cNvSpPr>
+          <p:nvPr>
+            <p:ph type="sldNum" sz="quarter" idx="12"/>
+          </p:nvPr>
+        </p:nvSpPr>
+        <p:spPr/>
+        <p:txBody>
+          <a:bodyPr/>
+          <a:lstStyle/>
+          <a:p>
+            <a:pPr>
+              <a:defRPr/>
+            </a:pPr>
+            <a:fld id="{3464530E-D695-45C9-AFB6-E411BBE0972A}" type="slidenum">
+              <a:rPr lang="en-US" smtClean="0"/>
+              <a:pPr>
+                <a:defRPr/>
+              </a:pPr>
+              <a:t>16</a:t>
+            </a:fld>
+            <a:endParaRPr lang="en-US"/>
+          </a:p>
+        </p:txBody>
+      </p:sp>
+      <p:pic>
+        <p:nvPicPr>
+          <p:cNvPr id="5" name="Picture 4">
+            <a:extLst>
+              <a:ext uri="{FF2B5EF4-FFF2-40B4-BE49-F238E27FC236}">
+                <a16:creationId xmlns:a16="http://schemas.microsoft.com/office/drawing/2014/main" id="{AE25E530-BA9D-DC43-BC1D-B7CC86F448D3}"/>
+              </a:ext>
+            </a:extLst>
+          </p:cNvPr>
+          <p:cNvPicPr>
+            <a:picLocks noChangeAspect="1"/>
+          </p:cNvPicPr>
+          <p:nvPr/>
+        </p:nvPicPr>
+        <p:blipFill>
+          <a:blip r:embed="rId2"/>
+          <a:stretch>
+            <a:fillRect/>
+          </a:stretch>
+        </p:blipFill>
+        <p:spPr>
+          <a:xfrm>
+            <a:off x="0" y="1055421"/>
+            <a:ext cx="9144000" cy="5304195"/>
+          </a:xfrm>
+          <a:prstGeom prst="rect">
+            <a:avLst/>
+          </a:prstGeom>
+        </p:spPr>
+      </p:pic>
+      <p:sp>
+        <p:nvSpPr>
+          <p:cNvPr id="6" name="Right Arrow 5">
+            <a:extLst>
+              <a:ext uri="{FF2B5EF4-FFF2-40B4-BE49-F238E27FC236}">
+                <a16:creationId xmlns:a16="http://schemas.microsoft.com/office/drawing/2014/main" id="{66FBE03B-44FE-364E-A2EE-D0A95A683787}"/>
+              </a:ext>
+            </a:extLst>
+          </p:cNvPr>
+          <p:cNvSpPr/>
+          <p:nvPr/>
+        </p:nvSpPr>
+        <p:spPr bwMode="auto">
+          <a:xfrm rot="1951717">
+            <a:off x="850900" y="3810001"/>
+            <a:ext cx="1079500" cy="749300"/>
+          </a:xfrm>
+          <a:prstGeom prst="rightArrow">
+            <a:avLst>
+              <a:gd name="adj1" fmla="val 50000"/>
+              <a:gd name="adj2" fmla="val 49527"/>
+            </a:avLst>
+          </a:prstGeom>
+          <a:ln>
+            <a:headEnd type="none" w="med" len="med"/>
+            <a:tailEnd type="none" w="med" len="med"/>
+          </a:ln>
+        </p:spPr>
+        <p:style>
+          <a:lnRef idx="1">
+            <a:schemeClr val="accent2"/>
+          </a:lnRef>
+          <a:fillRef idx="2">
+            <a:schemeClr val="accent2"/>
+          </a:fillRef>
+          <a:effectRef idx="1">
+            <a:schemeClr val="accent2"/>
+          </a:effectRef>
+          <a:fontRef idx="minor">
+            <a:schemeClr val="dk1"/>
+          </a:fontRef>
+        </p:style>
+        <p:txBody>
+          <a:bodyPr vert="horz" wrap="square" lIns="91440" tIns="45720" rIns="91440" bIns="45720" numCol="1" rtlCol="0" anchor="t" anchorCtr="0" compatLnSpc="1">
+            <a:prstTxWarp prst="textNoShape">
+              <a:avLst/>
+            </a:prstTxWarp>
+            <a:spAutoFit/>
+          </a:bodyPr>
+          <a:lstStyle/>
+          <a:p>
+            <a:pPr marL="0" marR="0" indent="0" algn="l" defTabSz="914400" rtl="0" eaLnBrk="0" fontAlgn="base" latinLnBrk="0" hangingPunct="0">
+              <a:lnSpc>
+                <a:spcPct val="100000"/>
+              </a:lnSpc>
+              <a:spcBef>
+                <a:spcPct val="50000"/>
+              </a:spcBef>
+              <a:spcAft>
+                <a:spcPct val="0"/>
+              </a:spcAft>
+              <a:buClrTx/>
+              <a:buSzTx/>
+              <a:buFontTx/>
+              <a:buNone/>
+              <a:tabLst/>
+            </a:pPr>
+            <a:endParaRPr kumimoji="0" lang="en-US" sz="2000" b="0" i="0" u="none" strike="noStrike" cap="none" normalizeH="0" baseline="0">
+              <a:ln>
+                <a:noFill/>
+              </a:ln>
+              <a:solidFill>
+                <a:schemeClr val="tx1"/>
+              </a:solidFill>
+              <a:effectLst/>
+              <a:latin typeface="Arial" charset="0"/>
+            </a:endParaRPr>
+          </a:p>
+        </p:txBody>
+      </p:sp>
+    </p:spTree>
+    <p:extLst>
+      <p:ext uri="{BB962C8B-B14F-4D97-AF65-F5344CB8AC3E}">
+        <p14:creationId xmlns:p14="http://schemas.microsoft.com/office/powerpoint/2010/main" val="101685200"/>
+      </p:ext>
+    </p:extLst>
+  </p:cSld>
+  <p:clrMapOvr>
+    <a:masterClrMapping/>
+  </p:clrMapOvr>
+</p:sld>
+</file>
+
+<file path=ppt/slides/slide17.xml><?xml version="1.0" encoding="utf-8"?>
+<p:sld xmlns:a="http://schemas.openxmlformats.org/drawingml/2006/main" xmlns:r="http://schemas.openxmlformats.org/officeDocument/2006/relationships" xmlns:p="http://schemas.openxmlformats.org/presentationml/2006/main">
+  <p:cSld>
+    <p:spTree>
+      <p:nvGrpSpPr>
+        <p:cNvPr id="1" name=""/>
+        <p:cNvGrpSpPr/>
+        <p:nvPr/>
+      </p:nvGrpSpPr>
+      <p:grpSpPr>
+        <a:xfrm>
+          <a:off x="0" y="0"/>
+          <a:ext cx="0" cy="0"/>
+          <a:chOff x="0" y="0"/>
+          <a:chExt cx="0" cy="0"/>
+        </a:xfrm>
+      </p:grpSpPr>
+      <p:sp>
+        <p:nvSpPr>
+          <p:cNvPr id="2" name="Title 1">
+            <a:extLst>
+              <a:ext uri="{FF2B5EF4-FFF2-40B4-BE49-F238E27FC236}">
+                <a16:creationId xmlns:a16="http://schemas.microsoft.com/office/drawing/2014/main" id="{AB55173A-C795-D24A-9CAE-03383CA21512}"/>
+              </a:ext>
+            </a:extLst>
+          </p:cNvPr>
+          <p:cNvSpPr>
+            <a:spLocks noGrp="1"/>
+          </p:cNvSpPr>
+          <p:nvPr>
+            <p:ph type="title"/>
+          </p:nvPr>
+        </p:nvSpPr>
+        <p:spPr/>
+        <p:txBody>
+          <a:bodyPr/>
+          <a:lstStyle/>
+          <a:p>
+            <a:r>
+              <a:rPr lang="en-US" dirty="0"/>
+              <a:t>Contributing File</a:t>
+            </a:r>
+          </a:p>
+        </p:txBody>
+      </p:sp>
+      <p:sp>
+        <p:nvSpPr>
+          <p:cNvPr id="3" name="Content Placeholder 2">
+            <a:extLst>
+              <a:ext uri="{FF2B5EF4-FFF2-40B4-BE49-F238E27FC236}">
+                <a16:creationId xmlns:a16="http://schemas.microsoft.com/office/drawing/2014/main" id="{F0C6A830-A582-A245-ACA4-A2A028FD5D14}"/>
+              </a:ext>
+            </a:extLst>
+          </p:cNvPr>
+          <p:cNvSpPr>
+            <a:spLocks noGrp="1"/>
+          </p:cNvSpPr>
+          <p:nvPr>
+            <p:ph idx="1"/>
+          </p:nvPr>
+        </p:nvSpPr>
+        <p:spPr/>
+        <p:txBody>
+          <a:bodyPr/>
+          <a:lstStyle/>
+          <a:p>
+            <a:r>
+              <a:rPr lang="en-US" dirty="0"/>
+              <a:t>How to file a bug report </a:t>
+            </a:r>
+          </a:p>
+          <a:p>
+            <a:endParaRPr lang="en-US" dirty="0"/>
+          </a:p>
+          <a:p>
+            <a:r>
+              <a:rPr lang="en-US" dirty="0"/>
+              <a:t>How to suggest a new feature</a:t>
+            </a:r>
+          </a:p>
+          <a:p>
+            <a:endParaRPr lang="en-US" dirty="0"/>
+          </a:p>
+          <a:p>
+            <a:r>
+              <a:rPr lang="en-US" dirty="0"/>
+              <a:t>How to set up your environment </a:t>
+            </a:r>
+          </a:p>
+          <a:p>
+            <a:pPr marL="0" indent="0">
+              <a:buNone/>
+            </a:pPr>
+            <a:endParaRPr lang="en-US" dirty="0"/>
+          </a:p>
+          <a:p>
+            <a:r>
+              <a:rPr lang="en-US" dirty="0"/>
+              <a:t>Coding standards/code styles</a:t>
+            </a:r>
+          </a:p>
+          <a:p>
+            <a:endParaRPr lang="en-US" dirty="0"/>
+          </a:p>
+          <a:p>
+            <a:r>
+              <a:rPr lang="en-US" dirty="0"/>
+              <a:t>Your roadmap or vision for the project</a:t>
+            </a:r>
+          </a:p>
+          <a:p>
+            <a:endParaRPr lang="en-US" dirty="0"/>
+          </a:p>
+          <a:p>
+            <a:r>
+              <a:rPr lang="en-US" dirty="0"/>
+              <a:t>How contributors should (or should not) get in touch with you</a:t>
+            </a:r>
+          </a:p>
+          <a:p>
+            <a:endParaRPr lang="en-US" dirty="0"/>
+          </a:p>
+        </p:txBody>
+      </p:sp>
+      <p:sp>
+        <p:nvSpPr>
+          <p:cNvPr id="4" name="Slide Number Placeholder 3">
+            <a:extLst>
+              <a:ext uri="{FF2B5EF4-FFF2-40B4-BE49-F238E27FC236}">
+                <a16:creationId xmlns:a16="http://schemas.microsoft.com/office/drawing/2014/main" id="{B5E75F6C-F140-5A4D-8693-EF709E77BF54}"/>
+              </a:ext>
+            </a:extLst>
+          </p:cNvPr>
+          <p:cNvSpPr>
+            <a:spLocks noGrp="1"/>
+          </p:cNvSpPr>
+          <p:nvPr>
+            <p:ph type="sldNum" sz="quarter" idx="12"/>
+          </p:nvPr>
+        </p:nvSpPr>
+        <p:spPr/>
+        <p:txBody>
+          <a:bodyPr/>
+          <a:lstStyle/>
+          <a:p>
+            <a:pPr>
+              <a:defRPr/>
+            </a:pPr>
+            <a:fld id="{3464530E-D695-45C9-AFB6-E411BBE0972A}" type="slidenum">
+              <a:rPr lang="en-US" smtClean="0"/>
+              <a:pPr>
+                <a:defRPr/>
+              </a:pPr>
+              <a:t>17</a:t>
+            </a:fld>
+            <a:endParaRPr lang="en-US"/>
+          </a:p>
+        </p:txBody>
+      </p:sp>
+    </p:spTree>
+    <p:extLst>
+      <p:ext uri="{BB962C8B-B14F-4D97-AF65-F5344CB8AC3E}">
+        <p14:creationId xmlns:p14="http://schemas.microsoft.com/office/powerpoint/2010/main" val="1977333402"/>
+      </p:ext>
+    </p:extLst>
+  </p:cSld>
+  <p:clrMapOvr>
+    <a:masterClrMapping/>
+  </p:clrMapOvr>
+</p:sld>
+</file>
+
+<file path=ppt/slides/slide18.xml><?xml version="1.0" encoding="utf-8"?>
+<p:sld xmlns:a="http://schemas.openxmlformats.org/drawingml/2006/main" xmlns:r="http://schemas.openxmlformats.org/officeDocument/2006/relationships" xmlns:p="http://schemas.openxmlformats.org/presentationml/2006/main">
+  <p:cSld>
+    <p:spTree>
+      <p:nvGrpSpPr>
+        <p:cNvPr id="1" name=""/>
+        <p:cNvGrpSpPr/>
+        <p:nvPr/>
+      </p:nvGrpSpPr>
+      <p:grpSpPr>
+        <a:xfrm>
+          <a:off x="0" y="0"/>
+          <a:ext cx="0" cy="0"/>
+          <a:chOff x="0" y="0"/>
+          <a:chExt cx="0" cy="0"/>
+        </a:xfrm>
+      </p:grpSpPr>
+      <p:sp>
+        <p:nvSpPr>
+          <p:cNvPr id="2" name="Title 1">
+            <a:extLst>
+              <a:ext uri="{FF2B5EF4-FFF2-40B4-BE49-F238E27FC236}">
+                <a16:creationId xmlns:a16="http://schemas.microsoft.com/office/drawing/2014/main" id="{F30CB971-B248-064A-85E5-97F6E434C903}"/>
+              </a:ext>
+            </a:extLst>
+          </p:cNvPr>
+          <p:cNvSpPr>
+            <a:spLocks noGrp="1"/>
+          </p:cNvSpPr>
+          <p:nvPr>
+            <p:ph type="title"/>
+          </p:nvPr>
+        </p:nvSpPr>
+        <p:spPr/>
+        <p:txBody>
+          <a:bodyPr/>
+          <a:lstStyle/>
+          <a:p>
+            <a:r>
+              <a:rPr lang="en-US" dirty="0"/>
+              <a:t>Contributing File</a:t>
+            </a:r>
+          </a:p>
+        </p:txBody>
+      </p:sp>
+      <p:sp>
+        <p:nvSpPr>
+          <p:cNvPr id="3" name="Content Placeholder 2">
+            <a:extLst>
+              <a:ext uri="{FF2B5EF4-FFF2-40B4-BE49-F238E27FC236}">
+                <a16:creationId xmlns:a16="http://schemas.microsoft.com/office/drawing/2014/main" id="{B022DF52-A92D-174E-AD97-F36A747BEE8C}"/>
+              </a:ext>
+            </a:extLst>
+          </p:cNvPr>
+          <p:cNvSpPr>
+            <a:spLocks noGrp="1"/>
+          </p:cNvSpPr>
+          <p:nvPr>
+            <p:ph idx="1"/>
+          </p:nvPr>
+        </p:nvSpPr>
+        <p:spPr/>
+        <p:txBody>
+          <a:bodyPr/>
+          <a:lstStyle/>
+          <a:p>
+            <a:pPr marL="0" indent="0">
+              <a:buNone/>
+            </a:pPr>
+            <a:endParaRPr lang="en-US" dirty="0"/>
+          </a:p>
+          <a:p>
+            <a:r>
+              <a:rPr lang="en-US" dirty="0"/>
+              <a:t>CONTRIBUTING file can be simple (for starters)</a:t>
+            </a:r>
+          </a:p>
+          <a:p>
+            <a:endParaRPr lang="en-US" dirty="0"/>
+          </a:p>
+          <a:p>
+            <a:endParaRPr lang="en-US" dirty="0"/>
+          </a:p>
+          <a:p>
+            <a:r>
+              <a:rPr lang="en-US" dirty="0"/>
+              <a:t>FAQ section fits good here</a:t>
+            </a:r>
+          </a:p>
+          <a:p>
+            <a:endParaRPr lang="en-US" dirty="0"/>
+          </a:p>
+          <a:p>
+            <a:endParaRPr lang="en-US" dirty="0"/>
+          </a:p>
+          <a:p>
+            <a:r>
+              <a:rPr lang="en-US" dirty="0"/>
+              <a:t>Link to your CONTRIBUTING file from your README</a:t>
+            </a:r>
+          </a:p>
+          <a:p>
+            <a:endParaRPr lang="en-US" dirty="0"/>
+          </a:p>
+          <a:p>
+            <a:endParaRPr lang="en-US" dirty="0"/>
+          </a:p>
+          <a:p>
+            <a:r>
+              <a:rPr lang="en-US" dirty="0"/>
+              <a:t>Nice template: </a:t>
+            </a:r>
+            <a:r>
+              <a:rPr lang="en-US" dirty="0">
+                <a:hlinkClick r:id="rId2"/>
+              </a:rPr>
+              <a:t>https://github.com/nayafia/contributing-template/blob/master/CONTRIBUTING-template.md</a:t>
+            </a:r>
+            <a:r>
+              <a:rPr lang="en-US" dirty="0"/>
+              <a:t> </a:t>
+            </a:r>
+          </a:p>
+          <a:p>
+            <a:endParaRPr lang="en-US" dirty="0"/>
+          </a:p>
+          <a:p>
+            <a:endParaRPr lang="en-US" dirty="0"/>
+          </a:p>
+        </p:txBody>
+      </p:sp>
+      <p:sp>
+        <p:nvSpPr>
+          <p:cNvPr id="4" name="Slide Number Placeholder 3">
+            <a:extLst>
+              <a:ext uri="{FF2B5EF4-FFF2-40B4-BE49-F238E27FC236}">
+                <a16:creationId xmlns:a16="http://schemas.microsoft.com/office/drawing/2014/main" id="{FAB6E8AE-585E-CD44-AC7D-A255BA13416E}"/>
+              </a:ext>
+            </a:extLst>
+          </p:cNvPr>
+          <p:cNvSpPr>
+            <a:spLocks noGrp="1"/>
+          </p:cNvSpPr>
+          <p:nvPr>
+            <p:ph type="sldNum" sz="quarter" idx="12"/>
+          </p:nvPr>
+        </p:nvSpPr>
+        <p:spPr/>
+        <p:txBody>
+          <a:bodyPr/>
+          <a:lstStyle/>
+          <a:p>
+            <a:pPr>
+              <a:defRPr/>
+            </a:pPr>
+            <a:fld id="{3464530E-D695-45C9-AFB6-E411BBE0972A}" type="slidenum">
+              <a:rPr lang="en-US" smtClean="0"/>
+              <a:pPr>
+                <a:defRPr/>
+              </a:pPr>
+              <a:t>18</a:t>
+            </a:fld>
+            <a:endParaRPr lang="en-US"/>
+          </a:p>
+        </p:txBody>
+      </p:sp>
+    </p:spTree>
+    <p:extLst>
+      <p:ext uri="{BB962C8B-B14F-4D97-AF65-F5344CB8AC3E}">
+        <p14:creationId xmlns:p14="http://schemas.microsoft.com/office/powerpoint/2010/main" val="28225656"/>
+      </p:ext>
+    </p:extLst>
+  </p:cSld>
+  <p:clrMapOvr>
+    <a:masterClrMapping/>
+  </p:clrMapOvr>
+</p:sld>
+</file>
+
+<file path=ppt/slides/slide19.xml><?xml version="1.0" encoding="utf-8"?>
+<p:sld xmlns:a="http://schemas.openxmlformats.org/drawingml/2006/main" xmlns:r="http://schemas.openxmlformats.org/officeDocument/2006/relationships" xmlns:p="http://schemas.openxmlformats.org/presentationml/2006/main">
+  <p:cSld>
+    <p:spTree>
+      <p:nvGrpSpPr>
+        <p:cNvPr id="1" name=""/>
+        <p:cNvGrpSpPr/>
+        <p:nvPr/>
+      </p:nvGrpSpPr>
+      <p:grpSpPr>
+        <a:xfrm>
+          <a:off x="0" y="0"/>
+          <a:ext cx="0" cy="0"/>
+          <a:chOff x="0" y="0"/>
+          <a:chExt cx="0" cy="0"/>
+        </a:xfrm>
+      </p:grpSpPr>
+      <p:sp>
+        <p:nvSpPr>
+          <p:cNvPr id="2" name="Title 1">
+            <a:extLst>
+              <a:ext uri="{FF2B5EF4-FFF2-40B4-BE49-F238E27FC236}">
+                <a16:creationId xmlns:a16="http://schemas.microsoft.com/office/drawing/2014/main" id="{8F88B508-B9FE-D248-83AD-5E87882125C1}"/>
+              </a:ext>
+            </a:extLst>
+          </p:cNvPr>
+          <p:cNvSpPr>
+            <a:spLocks noGrp="1"/>
+          </p:cNvSpPr>
+          <p:nvPr>
+            <p:ph type="title"/>
+          </p:nvPr>
+        </p:nvSpPr>
+        <p:spPr/>
+        <p:txBody>
+          <a:bodyPr/>
+          <a:lstStyle/>
+          <a:p>
+            <a:r>
+              <a:rPr lang="en-US" dirty="0"/>
+              <a:t>Code of Conduct</a:t>
+            </a:r>
+          </a:p>
+        </p:txBody>
+      </p:sp>
+      <p:sp>
+        <p:nvSpPr>
+          <p:cNvPr id="3" name="Content Placeholder 2">
+            <a:extLst>
+              <a:ext uri="{FF2B5EF4-FFF2-40B4-BE49-F238E27FC236}">
+                <a16:creationId xmlns:a16="http://schemas.microsoft.com/office/drawing/2014/main" id="{DBBE053B-6846-AF46-AB96-4B0EED8D9AF7}"/>
+              </a:ext>
+            </a:extLst>
+          </p:cNvPr>
+          <p:cNvSpPr>
+            <a:spLocks noGrp="1"/>
+          </p:cNvSpPr>
+          <p:nvPr>
+            <p:ph idx="1"/>
+          </p:nvPr>
+        </p:nvSpPr>
+        <p:spPr/>
+        <p:txBody>
+          <a:bodyPr/>
+          <a:lstStyle/>
+          <a:p>
+            <a:endParaRPr lang="en-US" dirty="0"/>
+          </a:p>
+          <a:p>
+            <a:endParaRPr lang="en-US" dirty="0"/>
+          </a:p>
+          <a:p>
+            <a:endParaRPr lang="en-US" dirty="0"/>
+          </a:p>
+          <a:p>
+            <a:r>
+              <a:rPr lang="en-US" dirty="0"/>
+              <a:t>Sets ground rules for behavior for the participants</a:t>
+            </a:r>
+          </a:p>
+          <a:p>
+            <a:endParaRPr lang="en-US" dirty="0"/>
+          </a:p>
+          <a:p>
+            <a:r>
+              <a:rPr lang="en-US" dirty="0"/>
+              <a:t>Facilitates healthy, constructive community behavior</a:t>
+            </a:r>
+          </a:p>
+          <a:p>
+            <a:endParaRPr lang="en-US" dirty="0"/>
+          </a:p>
+          <a:p>
+            <a:r>
+              <a:rPr lang="en-US" dirty="0"/>
+              <a:t>Describes who these expectations apply to, when they apply, and what to do if a violation occurs</a:t>
+            </a:r>
+          </a:p>
+        </p:txBody>
+      </p:sp>
+      <p:sp>
+        <p:nvSpPr>
+          <p:cNvPr id="4" name="Slide Number Placeholder 3">
+            <a:extLst>
+              <a:ext uri="{FF2B5EF4-FFF2-40B4-BE49-F238E27FC236}">
+                <a16:creationId xmlns:a16="http://schemas.microsoft.com/office/drawing/2014/main" id="{EC617F56-BEFB-9647-9CEF-1A4774082D01}"/>
+              </a:ext>
+            </a:extLst>
+          </p:cNvPr>
+          <p:cNvSpPr>
+            <a:spLocks noGrp="1"/>
+          </p:cNvSpPr>
+          <p:nvPr>
+            <p:ph type="sldNum" sz="quarter" idx="12"/>
+          </p:nvPr>
+        </p:nvSpPr>
+        <p:spPr/>
+        <p:txBody>
+          <a:bodyPr/>
+          <a:lstStyle/>
+          <a:p>
+            <a:pPr>
+              <a:defRPr/>
+            </a:pPr>
+            <a:fld id="{3464530E-D695-45C9-AFB6-E411BBE0972A}" type="slidenum">
+              <a:rPr lang="en-US" smtClean="0"/>
+              <a:pPr>
+                <a:defRPr/>
+              </a:pPr>
+              <a:t>19</a:t>
+            </a:fld>
+            <a:endParaRPr lang="en-US"/>
+          </a:p>
+        </p:txBody>
+      </p:sp>
+    </p:spTree>
+    <p:extLst>
+      <p:ext uri="{BB962C8B-B14F-4D97-AF65-F5344CB8AC3E}">
+        <p14:creationId xmlns:p14="http://schemas.microsoft.com/office/powerpoint/2010/main" val="2964226374"/>
       </p:ext>
     </p:extLst>
   </p:cSld>
@@ -11710,7 +13312,7 @@
           <a:p>
             <a:r>
               <a:rPr lang="en-US" dirty="0"/>
-              <a:t>Code Review</a:t>
+              <a:t>Slides Based on</a:t>
             </a:r>
           </a:p>
         </p:txBody>
@@ -11744,68 +13346,85 @@
             <a:endParaRPr lang="en-US" dirty="0"/>
           </a:p>
           <a:p>
-            <a:r>
-              <a:rPr lang="en-US" dirty="0"/>
-              <a:t>Finding issues prior to go to the repo</a:t>
-            </a:r>
-          </a:p>
-          <a:p>
             <a:endParaRPr lang="en-US" dirty="0"/>
           </a:p>
           <a:p>
-            <a:pPr lvl="1"/>
-            <a:r>
-              <a:rPr lang="en-US" dirty="0"/>
-              <a:t>Sharing knowledge</a:t>
-            </a:r>
-          </a:p>
-          <a:p>
-            <a:pPr lvl="1"/>
-            <a:r>
-              <a:rPr lang="en-US" dirty="0"/>
-              <a:t>Consistency in a code base</a:t>
-            </a:r>
-          </a:p>
-          <a:p>
-            <a:pPr lvl="1"/>
+            <a:r>
+              <a:rPr lang="en-US" dirty="0">
+                <a:hlinkClick r:id="rId2"/>
+              </a:rPr>
+              <a:t>https://opensource.guide/starting-a-project/</a:t>
+            </a:r>
+            <a:endParaRPr lang="en-US" dirty="0"/>
+          </a:p>
+          <a:p>
+            <a:endParaRPr lang="en-US" dirty="0"/>
+          </a:p>
+          <a:p>
+            <a:endParaRPr lang="en-US" dirty="0"/>
+          </a:p>
+          <a:p>
+            <a:r>
+              <a:rPr lang="en-US" dirty="0"/>
+              <a:t>Fogel, Karl. </a:t>
+            </a:r>
             <a:r>
               <a:rPr lang="en-US" b="1" dirty="0"/>
-              <a:t>Legibility</a:t>
-            </a:r>
-          </a:p>
-          <a:p>
-            <a:pPr lvl="1"/>
+              <a:t>Producing Open Source Software. </a:t>
+            </a:r>
+            <a:r>
+              <a:rPr lang="en-US" dirty="0">
+                <a:hlinkClick r:id="rId3"/>
+              </a:rPr>
+              <a:t>https://producingoss.com/</a:t>
+            </a:r>
+            <a:r>
+              <a:rPr lang="en-US" dirty="0"/>
+              <a:t> </a:t>
+            </a:r>
+          </a:p>
+          <a:p>
+            <a:endParaRPr lang="en-US" b="1" dirty="0"/>
+          </a:p>
+          <a:p>
+            <a:r>
+              <a:rPr lang="en-US" dirty="0"/>
+              <a:t>Steinmacher, Igor; </a:t>
+            </a:r>
+            <a:r>
+              <a:rPr lang="en-US" dirty="0" err="1"/>
+              <a:t>Treude</a:t>
+            </a:r>
+            <a:r>
+              <a:rPr lang="en-US" dirty="0"/>
+              <a:t>, Christoph; Gerosa, Marco </a:t>
+            </a:r>
+            <a:r>
+              <a:rPr lang="en-US" dirty="0" err="1"/>
+              <a:t>Aurélio</a:t>
+            </a:r>
+            <a:r>
+              <a:rPr lang="en-US" dirty="0"/>
+              <a:t>. </a:t>
+            </a:r>
             <a:r>
               <a:rPr lang="en-US" b="1" dirty="0"/>
-              <a:t>Accidental errors</a:t>
+              <a:t>Let me in: Guidelines for the Successful Onboarding of Newcomers to Open Source Projects</a:t>
+            </a:r>
+            <a:r>
+              <a:rPr lang="en-US" dirty="0"/>
+              <a:t>, IEEE Software. </a:t>
+            </a:r>
+            <a:r>
+              <a:rPr lang="en-US" dirty="0">
+                <a:hlinkClick r:id="rId4"/>
+              </a:rPr>
+              <a:t>http://www.igor.pro.br/publica/papers/IEEESoft_2018.pdf</a:t>
             </a:r>
             <a:r>
               <a:rPr lang="en-US" dirty="0"/>
               <a:t> </a:t>
             </a:r>
-          </a:p>
-          <a:p>
-            <a:pPr lvl="1"/>
-            <a:r>
-              <a:rPr lang="en-US" b="1" dirty="0"/>
-              <a:t>Structural errors</a:t>
-            </a:r>
-            <a:r>
-              <a:rPr lang="en-US" dirty="0"/>
-              <a:t> </a:t>
-            </a:r>
-          </a:p>
-          <a:p>
-            <a:pPr lvl="1"/>
-            <a:r>
-              <a:rPr lang="en-US" b="1" dirty="0"/>
-              <a:t>Compliance</a:t>
-            </a:r>
-            <a:endParaRPr lang="en-US" dirty="0"/>
-          </a:p>
-          <a:p>
-            <a:pPr lvl="1"/>
-            <a:endParaRPr lang="en-US" dirty="0"/>
           </a:p>
           <a:p>
             <a:endParaRPr lang="en-US" dirty="0"/>
@@ -11816,6 +13435,476 @@
     <p:extLst>
       <p:ext uri="{BB962C8B-B14F-4D97-AF65-F5344CB8AC3E}">
         <p14:creationId xmlns:p14="http://schemas.microsoft.com/office/powerpoint/2010/main" val="3760840161"/>
+      </p:ext>
+    </p:extLst>
+  </p:cSld>
+  <p:clrMapOvr>
+    <a:masterClrMapping/>
+  </p:clrMapOvr>
+</p:sld>
+</file>
+
+<file path=ppt/slides/slide20.xml><?xml version="1.0" encoding="utf-8"?>
+<p:sld xmlns:a="http://schemas.openxmlformats.org/drawingml/2006/main" xmlns:r="http://schemas.openxmlformats.org/officeDocument/2006/relationships" xmlns:p="http://schemas.openxmlformats.org/presentationml/2006/main">
+  <p:cSld>
+    <p:spTree>
+      <p:nvGrpSpPr>
+        <p:cNvPr id="1" name=""/>
+        <p:cNvGrpSpPr/>
+        <p:nvPr/>
+      </p:nvGrpSpPr>
+      <p:grpSpPr>
+        <a:xfrm>
+          <a:off x="0" y="0"/>
+          <a:ext cx="0" cy="0"/>
+          <a:chOff x="0" y="0"/>
+          <a:chExt cx="0" cy="0"/>
+        </a:xfrm>
+      </p:grpSpPr>
+      <p:sp>
+        <p:nvSpPr>
+          <p:cNvPr id="2" name="Title 1">
+            <a:extLst>
+              <a:ext uri="{FF2B5EF4-FFF2-40B4-BE49-F238E27FC236}">
+                <a16:creationId xmlns:a16="http://schemas.microsoft.com/office/drawing/2014/main" id="{F9706D29-FC37-A54E-96D4-DCF16CF696C7}"/>
+              </a:ext>
+            </a:extLst>
+          </p:cNvPr>
+          <p:cNvSpPr>
+            <a:spLocks noGrp="1"/>
+          </p:cNvSpPr>
+          <p:nvPr>
+            <p:ph type="title"/>
+          </p:nvPr>
+        </p:nvSpPr>
+        <p:spPr/>
+        <p:txBody>
+          <a:bodyPr/>
+          <a:lstStyle/>
+          <a:p>
+            <a:r>
+              <a:rPr lang="en-US" dirty="0"/>
+              <a:t>You can also do</a:t>
+            </a:r>
+          </a:p>
+        </p:txBody>
+      </p:sp>
+      <p:sp>
+        <p:nvSpPr>
+          <p:cNvPr id="3" name="Content Placeholder 2">
+            <a:extLst>
+              <a:ext uri="{FF2B5EF4-FFF2-40B4-BE49-F238E27FC236}">
+                <a16:creationId xmlns:a16="http://schemas.microsoft.com/office/drawing/2014/main" id="{31D2AB97-EEA4-CF4A-B370-65FE6571BCE5}"/>
+              </a:ext>
+            </a:extLst>
+          </p:cNvPr>
+          <p:cNvSpPr>
+            <a:spLocks noGrp="1"/>
+          </p:cNvSpPr>
+          <p:nvPr>
+            <p:ph idx="1"/>
+          </p:nvPr>
+        </p:nvSpPr>
+        <p:spPr/>
+        <p:txBody>
+          <a:bodyPr/>
+          <a:lstStyle/>
+          <a:p>
+            <a:endParaRPr lang="en-US" dirty="0"/>
+          </a:p>
+          <a:p>
+            <a:endParaRPr lang="en-US" dirty="0"/>
+          </a:p>
+          <a:p>
+            <a:r>
+              <a:rPr lang="en-US" dirty="0"/>
+              <a:t>Create Issues and Pull requests templates</a:t>
+            </a:r>
+          </a:p>
+          <a:p>
+            <a:endParaRPr lang="en-US" dirty="0"/>
+          </a:p>
+          <a:p>
+            <a:r>
+              <a:rPr lang="en-US" dirty="0"/>
+              <a:t>Checklist of what is expected for the Pull request or Issue</a:t>
+            </a:r>
+          </a:p>
+          <a:p>
+            <a:pPr lvl="1"/>
+            <a:r>
+              <a:rPr lang="en-US" dirty="0"/>
+              <a:t>Communicate what you want the contributors to report/do </a:t>
+            </a:r>
+          </a:p>
+        </p:txBody>
+      </p:sp>
+      <p:sp>
+        <p:nvSpPr>
+          <p:cNvPr id="4" name="Slide Number Placeholder 3">
+            <a:extLst>
+              <a:ext uri="{FF2B5EF4-FFF2-40B4-BE49-F238E27FC236}">
+                <a16:creationId xmlns:a16="http://schemas.microsoft.com/office/drawing/2014/main" id="{DCF8B8F7-29C9-3E46-89B9-EEDF2100BDDA}"/>
+              </a:ext>
+            </a:extLst>
+          </p:cNvPr>
+          <p:cNvSpPr>
+            <a:spLocks noGrp="1"/>
+          </p:cNvSpPr>
+          <p:nvPr>
+            <p:ph type="sldNum" sz="quarter" idx="12"/>
+          </p:nvPr>
+        </p:nvSpPr>
+        <p:spPr/>
+        <p:txBody>
+          <a:bodyPr/>
+          <a:lstStyle/>
+          <a:p>
+            <a:pPr>
+              <a:defRPr/>
+            </a:pPr>
+            <a:fld id="{3464530E-D695-45C9-AFB6-E411BBE0972A}" type="slidenum">
+              <a:rPr lang="en-US" smtClean="0"/>
+              <a:pPr>
+                <a:defRPr/>
+              </a:pPr>
+              <a:t>20</a:t>
+            </a:fld>
+            <a:endParaRPr lang="en-US"/>
+          </a:p>
+        </p:txBody>
+      </p:sp>
+    </p:spTree>
+    <p:extLst>
+      <p:ext uri="{BB962C8B-B14F-4D97-AF65-F5344CB8AC3E}">
+        <p14:creationId xmlns:p14="http://schemas.microsoft.com/office/powerpoint/2010/main" val="2674002319"/>
+      </p:ext>
+    </p:extLst>
+  </p:cSld>
+  <p:clrMapOvr>
+    <a:masterClrMapping/>
+  </p:clrMapOvr>
+</p:sld>
+</file>
+
+<file path=ppt/slides/slide21.xml><?xml version="1.0" encoding="utf-8"?>
+<p:sld xmlns:a="http://schemas.openxmlformats.org/drawingml/2006/main" xmlns:r="http://schemas.openxmlformats.org/officeDocument/2006/relationships" xmlns:p="http://schemas.openxmlformats.org/presentationml/2006/main">
+  <p:cSld>
+    <p:spTree>
+      <p:nvGrpSpPr>
+        <p:cNvPr id="1" name=""/>
+        <p:cNvGrpSpPr/>
+        <p:nvPr/>
+      </p:nvGrpSpPr>
+      <p:grpSpPr>
+        <a:xfrm>
+          <a:off x="0" y="0"/>
+          <a:ext cx="0" cy="0"/>
+          <a:chOff x="0" y="0"/>
+          <a:chExt cx="0" cy="0"/>
+        </a:xfrm>
+      </p:grpSpPr>
+      <p:sp>
+        <p:nvSpPr>
+          <p:cNvPr id="2" name="Title 1">
+            <a:extLst>
+              <a:ext uri="{FF2B5EF4-FFF2-40B4-BE49-F238E27FC236}">
+                <a16:creationId xmlns:a16="http://schemas.microsoft.com/office/drawing/2014/main" id="{1A93F8BC-9B37-4F4E-9D3A-2BCE74592C7C}"/>
+              </a:ext>
+            </a:extLst>
+          </p:cNvPr>
+          <p:cNvSpPr>
+            <a:spLocks noGrp="1"/>
+          </p:cNvSpPr>
+          <p:nvPr>
+            <p:ph type="title"/>
+          </p:nvPr>
+        </p:nvSpPr>
+        <p:spPr/>
+        <p:txBody>
+          <a:bodyPr/>
+          <a:lstStyle/>
+          <a:p>
+            <a:endParaRPr lang="en-US"/>
+          </a:p>
+        </p:txBody>
+      </p:sp>
+      <p:sp>
+        <p:nvSpPr>
+          <p:cNvPr id="3" name="Content Placeholder 2">
+            <a:extLst>
+              <a:ext uri="{FF2B5EF4-FFF2-40B4-BE49-F238E27FC236}">
+                <a16:creationId xmlns:a16="http://schemas.microsoft.com/office/drawing/2014/main" id="{C032EB0D-0069-EA42-9F9A-051D9839D050}"/>
+              </a:ext>
+            </a:extLst>
+          </p:cNvPr>
+          <p:cNvSpPr>
+            <a:spLocks noGrp="1"/>
+          </p:cNvSpPr>
+          <p:nvPr>
+            <p:ph idx="1"/>
+          </p:nvPr>
+        </p:nvSpPr>
+        <p:spPr/>
+        <p:txBody>
+          <a:bodyPr/>
+          <a:lstStyle/>
+          <a:p>
+            <a:endParaRPr lang="en-US"/>
+          </a:p>
+        </p:txBody>
+      </p:sp>
+      <p:sp>
+        <p:nvSpPr>
+          <p:cNvPr id="4" name="Slide Number Placeholder 3">
+            <a:extLst>
+              <a:ext uri="{FF2B5EF4-FFF2-40B4-BE49-F238E27FC236}">
+                <a16:creationId xmlns:a16="http://schemas.microsoft.com/office/drawing/2014/main" id="{716B71EB-29C6-5C41-B1EB-3140B3A844F5}"/>
+              </a:ext>
+            </a:extLst>
+          </p:cNvPr>
+          <p:cNvSpPr>
+            <a:spLocks noGrp="1"/>
+          </p:cNvSpPr>
+          <p:nvPr>
+            <p:ph type="sldNum" sz="quarter" idx="12"/>
+          </p:nvPr>
+        </p:nvSpPr>
+        <p:spPr/>
+        <p:txBody>
+          <a:bodyPr/>
+          <a:lstStyle/>
+          <a:p>
+            <a:pPr>
+              <a:defRPr/>
+            </a:pPr>
+            <a:fld id="{3464530E-D695-45C9-AFB6-E411BBE0972A}" type="slidenum">
+              <a:rPr lang="en-US" smtClean="0"/>
+              <a:pPr>
+                <a:defRPr/>
+              </a:pPr>
+              <a:t>21</a:t>
+            </a:fld>
+            <a:endParaRPr lang="en-US"/>
+          </a:p>
+        </p:txBody>
+      </p:sp>
+      <p:pic>
+        <p:nvPicPr>
+          <p:cNvPr id="5" name="Picture 4">
+            <a:extLst>
+              <a:ext uri="{FF2B5EF4-FFF2-40B4-BE49-F238E27FC236}">
+                <a16:creationId xmlns:a16="http://schemas.microsoft.com/office/drawing/2014/main" id="{9638CA04-2C07-F042-9D96-EFB6E32FFACB}"/>
+              </a:ext>
+            </a:extLst>
+          </p:cNvPr>
+          <p:cNvPicPr>
+            <a:picLocks noChangeAspect="1"/>
+          </p:cNvPicPr>
+          <p:nvPr/>
+        </p:nvPicPr>
+        <p:blipFill>
+          <a:blip r:embed="rId2"/>
+          <a:stretch>
+            <a:fillRect/>
+          </a:stretch>
+        </p:blipFill>
+        <p:spPr>
+          <a:xfrm>
+            <a:off x="735508" y="0"/>
+            <a:ext cx="7672984" cy="6858000"/>
+          </a:xfrm>
+          <a:prstGeom prst="rect">
+            <a:avLst/>
+          </a:prstGeom>
+        </p:spPr>
+      </p:pic>
+    </p:spTree>
+    <p:extLst>
+      <p:ext uri="{BB962C8B-B14F-4D97-AF65-F5344CB8AC3E}">
+        <p14:creationId xmlns:p14="http://schemas.microsoft.com/office/powerpoint/2010/main" val="4209353926"/>
+      </p:ext>
+    </p:extLst>
+  </p:cSld>
+  <p:clrMapOvr>
+    <a:masterClrMapping/>
+  </p:clrMapOvr>
+</p:sld>
+</file>
+
+<file path=ppt/slides/slide22.xml><?xml version="1.0" encoding="utf-8"?>
+<p:sld xmlns:a="http://schemas.openxmlformats.org/drawingml/2006/main" xmlns:r="http://schemas.openxmlformats.org/officeDocument/2006/relationships" xmlns:p="http://schemas.openxmlformats.org/presentationml/2006/main">
+  <p:cSld>
+    <p:spTree>
+      <p:nvGrpSpPr>
+        <p:cNvPr id="1" name=""/>
+        <p:cNvGrpSpPr/>
+        <p:nvPr/>
+      </p:nvGrpSpPr>
+      <p:grpSpPr>
+        <a:xfrm>
+          <a:off x="0" y="0"/>
+          <a:ext cx="0" cy="0"/>
+          <a:chOff x="0" y="0"/>
+          <a:chExt cx="0" cy="0"/>
+        </a:xfrm>
+      </p:grpSpPr>
+      <p:sp>
+        <p:nvSpPr>
+          <p:cNvPr id="2" name="Title 1">
+            <a:extLst>
+              <a:ext uri="{FF2B5EF4-FFF2-40B4-BE49-F238E27FC236}">
+                <a16:creationId xmlns:a16="http://schemas.microsoft.com/office/drawing/2014/main" id="{7316468D-3DAC-7B4B-8523-621DD3C2833C}"/>
+              </a:ext>
+            </a:extLst>
+          </p:cNvPr>
+          <p:cNvSpPr>
+            <a:spLocks noGrp="1"/>
+          </p:cNvSpPr>
+          <p:nvPr>
+            <p:ph type="title"/>
+          </p:nvPr>
+        </p:nvSpPr>
+        <p:spPr/>
+        <p:txBody>
+          <a:bodyPr/>
+          <a:lstStyle/>
+          <a:p>
+            <a:r>
+              <a:rPr lang="en-US" dirty="0"/>
+              <a:t>THE ASSIGNMENT!!!</a:t>
+            </a:r>
+          </a:p>
+        </p:txBody>
+      </p:sp>
+      <p:sp>
+        <p:nvSpPr>
+          <p:cNvPr id="3" name="Content Placeholder 2">
+            <a:extLst>
+              <a:ext uri="{FF2B5EF4-FFF2-40B4-BE49-F238E27FC236}">
+                <a16:creationId xmlns:a16="http://schemas.microsoft.com/office/drawing/2014/main" id="{D919BAA9-0CF5-2144-B154-DFAF14AA0E86}"/>
+              </a:ext>
+            </a:extLst>
+          </p:cNvPr>
+          <p:cNvSpPr>
+            <a:spLocks noGrp="1"/>
+          </p:cNvSpPr>
+          <p:nvPr>
+            <p:ph idx="1"/>
+          </p:nvPr>
+        </p:nvSpPr>
+        <p:spPr/>
+        <p:txBody>
+          <a:bodyPr/>
+          <a:lstStyle/>
+          <a:p>
+            <a:r>
+              <a:rPr lang="en-US" dirty="0"/>
+              <a:t>Create a project under </a:t>
+            </a:r>
+            <a:r>
+              <a:rPr lang="en-US" dirty="0" err="1"/>
+              <a:t>github.com</a:t>
+            </a:r>
+            <a:r>
+              <a:rPr lang="en-US" dirty="0"/>
+              <a:t>/NAU-OSS</a:t>
+            </a:r>
+          </a:p>
+          <a:p>
+            <a:endParaRPr lang="en-US" dirty="0"/>
+          </a:p>
+          <a:p>
+            <a:r>
+              <a:rPr lang="en-US" dirty="0"/>
+              <a:t>Follow the guidelines at </a:t>
+            </a:r>
+            <a:r>
+              <a:rPr lang="en-US" dirty="0">
+                <a:hlinkClick r:id="rId2"/>
+              </a:rPr>
+              <a:t>http://opensource.guide</a:t>
+            </a:r>
+            <a:endParaRPr lang="en-US" dirty="0"/>
+          </a:p>
+          <a:p>
+            <a:endParaRPr lang="en-US" dirty="0"/>
+          </a:p>
+          <a:p>
+            <a:r>
+              <a:rPr lang="en-US" dirty="0"/>
+              <a:t>Think about all the details of the project</a:t>
+            </a:r>
+          </a:p>
+          <a:p>
+            <a:endParaRPr lang="en-US" dirty="0"/>
+          </a:p>
+          <a:p>
+            <a:r>
+              <a:rPr lang="en-US" dirty="0"/>
+              <a:t>Deadline is Oct. 4</a:t>
+            </a:r>
+          </a:p>
+          <a:p>
+            <a:endParaRPr lang="en-US" dirty="0"/>
+          </a:p>
+          <a:p>
+            <a:r>
+              <a:rPr lang="en-US" dirty="0"/>
+              <a:t>Details here: </a:t>
+            </a:r>
+            <a:r>
+              <a:rPr lang="en-US" dirty="0">
+                <a:hlinkClick r:id="rId3"/>
+              </a:rPr>
+              <a:t>https://github.com/igorsteinmacher/CS499-2018/blob/master/assignments/openYourProject.md</a:t>
+            </a:r>
+            <a:endParaRPr lang="en-US" dirty="0"/>
+          </a:p>
+          <a:p>
+            <a:endParaRPr lang="en-US" dirty="0"/>
+          </a:p>
+        </p:txBody>
+      </p:sp>
+      <p:sp>
+        <p:nvSpPr>
+          <p:cNvPr id="4" name="Slide Number Placeholder 3">
+            <a:extLst>
+              <a:ext uri="{FF2B5EF4-FFF2-40B4-BE49-F238E27FC236}">
+                <a16:creationId xmlns:a16="http://schemas.microsoft.com/office/drawing/2014/main" id="{34BEBE8A-DED1-7D43-95BE-664C19105249}"/>
+              </a:ext>
+            </a:extLst>
+          </p:cNvPr>
+          <p:cNvSpPr>
+            <a:spLocks noGrp="1"/>
+          </p:cNvSpPr>
+          <p:nvPr>
+            <p:ph type="sldNum" sz="quarter" idx="12"/>
+          </p:nvPr>
+        </p:nvSpPr>
+        <p:spPr/>
+        <p:txBody>
+          <a:bodyPr/>
+          <a:lstStyle/>
+          <a:p>
+            <a:pPr>
+              <a:defRPr/>
+            </a:pPr>
+            <a:fld id="{3464530E-D695-45C9-AFB6-E411BBE0972A}" type="slidenum">
+              <a:rPr lang="en-US" smtClean="0"/>
+              <a:pPr>
+                <a:defRPr/>
+              </a:pPr>
+              <a:t>22</a:t>
+            </a:fld>
+            <a:endParaRPr lang="en-US"/>
+          </a:p>
+        </p:txBody>
+      </p:sp>
+    </p:spTree>
+    <p:extLst>
+      <p:ext uri="{BB962C8B-B14F-4D97-AF65-F5344CB8AC3E}">
+        <p14:creationId xmlns:p14="http://schemas.microsoft.com/office/powerpoint/2010/main" val="3777329920"/>
       </p:ext>
     </p:extLst>
   </p:cSld>
@@ -11842,6 +13931,53 @@
           <a:chExt cx="0" cy="0"/>
         </a:xfrm>
       </p:grpSpPr>
+      <p:pic>
+        <p:nvPicPr>
+          <p:cNvPr id="1026" name="Picture 2" descr="Image result for what is it about">
+            <a:extLst>
+              <a:ext uri="{FF2B5EF4-FFF2-40B4-BE49-F238E27FC236}">
+                <a16:creationId xmlns:a16="http://schemas.microsoft.com/office/drawing/2014/main" id="{65B8AF82-F801-A14A-86DE-3D9D2BF55706}"/>
+              </a:ext>
+            </a:extLst>
+          </p:cNvPr>
+          <p:cNvPicPr>
+            <a:picLocks noChangeAspect="1" noChangeArrowheads="1"/>
+          </p:cNvPicPr>
+          <p:nvPr/>
+        </p:nvPicPr>
+        <p:blipFill>
+          <a:blip r:embed="rId2">
+            <a:extLst>
+              <a:ext uri="{28A0092B-C50C-407E-A947-70E740481C1C}">
+                <a14:useLocalDpi xmlns:a14="http://schemas.microsoft.com/office/drawing/2010/main" val="0"/>
+              </a:ext>
+            </a:extLst>
+          </a:blip>
+          <a:srcRect/>
+          <a:stretch>
+            <a:fillRect/>
+          </a:stretch>
+        </p:blipFill>
+        <p:spPr bwMode="auto">
+          <a:xfrm rot="20141755">
+            <a:off x="3399146" y="3447563"/>
+            <a:ext cx="5767918" cy="2167089"/>
+          </a:xfrm>
+          <a:prstGeom prst="rect">
+            <a:avLst/>
+          </a:prstGeom>
+          <a:noFill/>
+          <a:extLst>
+            <a:ext uri="{909E8E84-426E-40DD-AFC4-6F175D3DCCD1}">
+              <a14:hiddenFill xmlns:a14="http://schemas.microsoft.com/office/drawing/2010/main">
+                <a:solidFill>
+                  <a:srgbClr val="FFFFFF"/>
+                </a:solidFill>
+              </a14:hiddenFill>
+            </a:ext>
+          </a:extLst>
+        </p:spPr>
+      </p:pic>
       <p:sp>
         <p:nvSpPr>
           <p:cNvPr id="2" name="Title 1">
@@ -11858,14 +13994,19 @@
             <p:ph type="title"/>
           </p:nvPr>
         </p:nvSpPr>
-        <p:spPr/>
+        <p:spPr>
+          <a:xfrm>
+            <a:off x="457200" y="147287"/>
+            <a:ext cx="8305800" cy="990600"/>
+          </a:xfrm>
+        </p:spPr>
         <p:txBody>
           <a:bodyPr/>
           <a:lstStyle/>
           <a:p>
             <a:r>
               <a:rPr lang="en-US" dirty="0"/>
-              <a:t>Code Review – What to review</a:t>
+              <a:t>Starting It</a:t>
             </a:r>
           </a:p>
         </p:txBody>
@@ -11892,61 +14033,82 @@
           <a:lstStyle/>
           <a:p>
             <a:r>
-              <a:rPr lang="en-US" b="1" dirty="0"/>
-              <a:t>Correct Syntax</a:t>
+              <a:rPr lang="en-US" dirty="0"/>
+              <a:t>Use what you have</a:t>
+            </a:r>
+          </a:p>
+          <a:p>
+            <a:endParaRPr lang="en-US" dirty="0"/>
+          </a:p>
+          <a:p>
+            <a:r>
+              <a:rPr lang="en-US" dirty="0"/>
+              <a:t>Different paths</a:t>
             </a:r>
           </a:p>
           <a:p>
             <a:pPr lvl="1"/>
             <a:r>
               <a:rPr lang="en-US" dirty="0"/>
-              <a:t>Indentation</a:t>
+              <a:t>Own project </a:t>
+            </a:r>
+            <a:r>
+              <a:rPr lang="en-US" dirty="0">
+                <a:sym typeface="Wingdings" pitchFamily="2" charset="2"/>
+              </a:rPr>
+              <a:t> Open</a:t>
             </a:r>
           </a:p>
           <a:p>
             <a:pPr lvl="1"/>
             <a:r>
-              <a:rPr lang="en-US" dirty="0" err="1"/>
-              <a:t>Alignement</a:t>
-            </a:r>
-            <a:endParaRPr lang="en-US" dirty="0"/>
+              <a:rPr lang="en-US" dirty="0">
+                <a:sym typeface="Wingdings" pitchFamily="2" charset="2"/>
+              </a:rPr>
+              <a:t>Corporate project  Open</a:t>
+            </a:r>
           </a:p>
           <a:p>
             <a:pPr lvl="1"/>
-            <a:r>
-              <a:rPr lang="en-US" dirty="0"/>
-              <a:t>Removing commented (non-useful comments)</a:t>
-            </a:r>
-          </a:p>
-          <a:p>
-            <a:endParaRPr lang="en-US" b="1" dirty="0"/>
-          </a:p>
-          <a:p>
-            <a:r>
-              <a:rPr lang="en-US" b="1" dirty="0"/>
-              <a:t>Grammar / Naming</a:t>
+            <a:endParaRPr lang="en-US" b="0" dirty="0">
+              <a:sym typeface="Wingdings" pitchFamily="2" charset="2"/>
+            </a:endParaRPr>
+          </a:p>
+          <a:p>
+            <a:r>
+              <a:rPr lang="en-US" dirty="0">
+                <a:sym typeface="Wingdings" pitchFamily="2" charset="2"/>
+              </a:rPr>
+              <a:t>Decide the scope and make it clear</a:t>
             </a:r>
           </a:p>
           <a:p>
             <a:pPr lvl="1"/>
             <a:r>
-              <a:rPr lang="en-US" dirty="0"/>
-              <a:t>Spelling mistakes </a:t>
+              <a:rPr lang="en-US" dirty="0">
+                <a:sym typeface="Wingdings" pitchFamily="2" charset="2"/>
+              </a:rPr>
+              <a:t>What is it about?</a:t>
             </a:r>
           </a:p>
           <a:p>
             <a:pPr lvl="1"/>
             <a:r>
-              <a:rPr lang="en-US" dirty="0"/>
-              <a:t>Correct English </a:t>
+              <a:rPr lang="en-US" dirty="0">
+                <a:sym typeface="Wingdings" pitchFamily="2" charset="2"/>
+              </a:rPr>
+              <a:t>What is it not about?</a:t>
             </a:r>
           </a:p>
           <a:p>
             <a:pPr lvl="1"/>
-            <a:r>
-              <a:rPr lang="en-US" dirty="0"/>
-              <a:t>Variable, Function, Method names </a:t>
-            </a:r>
+            <a:endParaRPr lang="en-US" dirty="0">
+              <a:sym typeface="Wingdings" pitchFamily="2" charset="2"/>
+            </a:endParaRPr>
+          </a:p>
+          <a:p>
+            <a:pPr lvl="1"/>
+            <a:endParaRPr lang="en-US" b="0" dirty="0"/>
           </a:p>
           <a:p>
             <a:endParaRPr lang="en-US" dirty="0"/>
@@ -12023,7 +14185,7 @@
           <p:cNvPr id="2" name="Title 1">
             <a:extLst>
               <a:ext uri="{FF2B5EF4-FFF2-40B4-BE49-F238E27FC236}">
-                <a16:creationId xmlns:a16="http://schemas.microsoft.com/office/drawing/2014/main" id="{A1068518-37B1-6940-8D16-B0FFD580A82B}"/>
+                <a16:creationId xmlns:a16="http://schemas.microsoft.com/office/drawing/2014/main" id="{BD77D122-ACD2-8F46-8BFF-F89BFF1D5CB1}"/>
               </a:ext>
             </a:extLst>
           </p:cNvPr>
@@ -12041,7 +14203,7 @@
           <a:p>
             <a:r>
               <a:rPr lang="en-US" dirty="0"/>
-              <a:t>Code Review – What to review</a:t>
+              <a:t>Make things clear</a:t>
             </a:r>
           </a:p>
         </p:txBody>
@@ -12051,7 +14213,7 @@
           <p:cNvPr id="3" name="Content Placeholder 2">
             <a:extLst>
               <a:ext uri="{FF2B5EF4-FFF2-40B4-BE49-F238E27FC236}">
-                <a16:creationId xmlns:a16="http://schemas.microsoft.com/office/drawing/2014/main" id="{A5296463-81BB-B843-95AF-81FD2ADA6325}"/>
+                <a16:creationId xmlns:a16="http://schemas.microsoft.com/office/drawing/2014/main" id="{A9C3729F-B98C-344B-8205-37122C8E3BCA}"/>
               </a:ext>
             </a:extLst>
           </p:cNvPr>
@@ -12067,23 +14229,26 @@
           <a:bodyPr/>
           <a:lstStyle/>
           <a:p>
-            <a:r>
-              <a:rPr lang="en-US" b="1" dirty="0"/>
-              <a:t>Duplicate Code</a:t>
+            <a:endParaRPr lang="en-US" dirty="0"/>
+          </a:p>
+          <a:p>
+            <a:r>
+              <a:rPr lang="en-US" dirty="0"/>
+              <a:t>All the knowledge about the project needs to:</a:t>
             </a:r>
           </a:p>
           <a:p>
             <a:pPr lvl="1"/>
             <a:r>
               <a:rPr lang="en-US" dirty="0"/>
-              <a:t>DRY (Don’t Repeat Yourself) </a:t>
+              <a:t>Be public</a:t>
             </a:r>
           </a:p>
           <a:p>
             <a:pPr lvl="1"/>
             <a:r>
               <a:rPr lang="en-US" dirty="0"/>
-              <a:t>Maintaining duplicate code is hard</a:t>
+              <a:t>Be detailed</a:t>
             </a:r>
           </a:p>
           <a:p>
@@ -12092,47 +14257,69 @@
           </a:p>
           <a:p>
             <a:r>
-              <a:rPr lang="en-US" b="1" dirty="0"/>
-              <a:t>Technical Quality</a:t>
+              <a:rPr lang="en-US" dirty="0"/>
+              <a:t>Outsiders need to quickly understand all the details</a:t>
             </a:r>
           </a:p>
           <a:p>
             <a:pPr lvl="1"/>
             <a:r>
               <a:rPr lang="en-US" dirty="0"/>
-              <a:t>Code Logic</a:t>
+              <a:t>Design docs</a:t>
             </a:r>
           </a:p>
           <a:p>
             <a:pPr lvl="1"/>
             <a:r>
               <a:rPr lang="en-US" dirty="0"/>
-              <a:t>Code conventions</a:t>
-            </a:r>
-          </a:p>
-          <a:p>
-            <a:pPr lvl="2"/>
-            <a:r>
-              <a:rPr lang="en-US" dirty="0"/>
-              <a:t>Follow project conventions for style/naming</a:t>
+              <a:t>User manuals</a:t>
             </a:r>
           </a:p>
           <a:p>
             <a:pPr lvl="1"/>
             <a:r>
               <a:rPr lang="en-US" dirty="0"/>
-              <a:t>Is it possible to condense code?</a:t>
+              <a:t>Next steps (future features)</a:t>
             </a:r>
           </a:p>
           <a:p>
             <a:pPr lvl="1"/>
             <a:r>
               <a:rPr lang="en-US" dirty="0"/>
-              <a:t>Security vulnerabilities</a:t>
+              <a:t>How </a:t>
+            </a:r>
+            <a:r>
+              <a:rPr lang="en-US" dirty="0" err="1"/>
+              <a:t>To’s</a:t>
+            </a:r>
+            <a:r>
+              <a:rPr lang="en-US" dirty="0"/>
+              <a:t> </a:t>
             </a:r>
           </a:p>
           <a:p>
             <a:pPr lvl="1"/>
+            <a:r>
+              <a:rPr lang="en-US" dirty="0"/>
+              <a:t>Code standards</a:t>
+            </a:r>
+          </a:p>
+          <a:p>
+            <a:endParaRPr lang="en-US" dirty="0"/>
+          </a:p>
+          <a:p>
+            <a:r>
+              <a:rPr lang="en-US" dirty="0"/>
+              <a:t>Reduce the “</a:t>
+            </a:r>
+            <a:r>
+              <a:rPr lang="en-US" i="1" dirty="0" err="1"/>
+              <a:t>hacktivation</a:t>
+            </a:r>
+            <a:r>
+              <a:rPr lang="en-US" i="1" dirty="0"/>
+              <a:t> energy” [See Fogel’s] </a:t>
+            </a:r>
             <a:endParaRPr lang="en-US" dirty="0"/>
           </a:p>
         </p:txBody>
@@ -12142,7 +14329,7 @@
           <p:cNvPr id="4" name="Slide Number Placeholder 3">
             <a:extLst>
               <a:ext uri="{FF2B5EF4-FFF2-40B4-BE49-F238E27FC236}">
-                <a16:creationId xmlns:a16="http://schemas.microsoft.com/office/drawing/2014/main" id="{3C8C10AB-7229-1443-A55B-DD94C6B1CDF5}"/>
+                <a16:creationId xmlns:a16="http://schemas.microsoft.com/office/drawing/2014/main" id="{C3C434ED-1BA4-9D4F-83FA-E31E8CD32079}"/>
               </a:ext>
             </a:extLst>
           </p:cNvPr>
@@ -12175,7 +14362,7 @@
     </p:spTree>
     <p:extLst>
       <p:ext uri="{BB962C8B-B14F-4D97-AF65-F5344CB8AC3E}">
-        <p14:creationId xmlns:p14="http://schemas.microsoft.com/office/powerpoint/2010/main" val="139343327"/>
+        <p14:creationId xmlns:p14="http://schemas.microsoft.com/office/powerpoint/2010/main" val="101974590"/>
       </p:ext>
     </p:extLst>
   </p:cSld>
@@ -12207,7 +14394,7 @@
           <p:cNvPr id="2" name="Title 1">
             <a:extLst>
               <a:ext uri="{FF2B5EF4-FFF2-40B4-BE49-F238E27FC236}">
-                <a16:creationId xmlns:a16="http://schemas.microsoft.com/office/drawing/2014/main" id="{DC3DC807-A9D3-BA48-A037-3E6208715DF4}"/>
+                <a16:creationId xmlns:a16="http://schemas.microsoft.com/office/drawing/2014/main" id="{94CBF5C2-CB4D-E744-A76D-EFCE4F47A1C6}"/>
               </a:ext>
             </a:extLst>
           </p:cNvPr>
@@ -12225,7 +14412,7 @@
           <a:p>
             <a:r>
               <a:rPr lang="en-US" dirty="0"/>
-              <a:t>Code Review – What to review</a:t>
+              <a:t>Name and Surroundings</a:t>
             </a:r>
           </a:p>
         </p:txBody>
@@ -12235,7 +14422,7 @@
           <p:cNvPr id="3" name="Content Placeholder 2">
             <a:extLst>
               <a:ext uri="{FF2B5EF4-FFF2-40B4-BE49-F238E27FC236}">
-                <a16:creationId xmlns:a16="http://schemas.microsoft.com/office/drawing/2014/main" id="{8E28708F-DFDF-C440-91B0-580776E45EE8}"/>
+                <a16:creationId xmlns:a16="http://schemas.microsoft.com/office/drawing/2014/main" id="{68AD0381-4CB9-184B-A832-ED87C71547D7}"/>
               </a:ext>
             </a:extLst>
           </p:cNvPr>
@@ -12251,23 +14438,52 @@
           <a:bodyPr/>
           <a:lstStyle/>
           <a:p>
-            <a:r>
-              <a:rPr lang="en-US" dirty="0"/>
-              <a:t>Error Handling</a:t>
+            <a:endParaRPr lang="en-US" dirty="0"/>
+          </a:p>
+          <a:p>
+            <a:r>
+              <a:rPr lang="en-US" dirty="0"/>
+              <a:t>Choose a name that represents the goal of the project</a:t>
             </a:r>
           </a:p>
           <a:p>
             <a:pPr lvl="1"/>
             <a:r>
               <a:rPr lang="en-US" dirty="0"/>
-              <a:t>Are exceptions being captured/treated correctly?</a:t>
+              <a:t>But easy to say and remember</a:t>
+            </a:r>
+          </a:p>
+          <a:p>
+            <a:endParaRPr lang="en-US" dirty="0"/>
+          </a:p>
+          <a:p>
+            <a:r>
+              <a:rPr lang="en-US" dirty="0"/>
+              <a:t>Look around for trademarks, projects with same name etc.</a:t>
+            </a:r>
+          </a:p>
+          <a:p>
+            <a:endParaRPr lang="en-US" dirty="0"/>
+          </a:p>
+          <a:p>
+            <a:r>
+              <a:rPr lang="en-US" dirty="0"/>
+              <a:t>Having a domain is interesting </a:t>
             </a:r>
           </a:p>
           <a:p>
             <a:pPr lvl="1"/>
             <a:r>
               <a:rPr lang="en-US" dirty="0"/>
-              <a:t>Human readable messages being displayed</a:t>
+              <a:t>checking for the name looking for the .org, </a:t>
+            </a:r>
+            <a:r>
+              <a:rPr lang="en-US" dirty="0" err="1"/>
+              <a:t>.net</a:t>
+            </a:r>
+            <a:r>
+              <a:rPr lang="en-US" dirty="0"/>
+              <a:t>, .com also helps looking for already existing things</a:t>
             </a:r>
           </a:p>
           <a:p>
@@ -12275,29 +14491,7 @@
             <a:endParaRPr lang="en-US" dirty="0"/>
           </a:p>
           <a:p>
-            <a:r>
-              <a:rPr lang="en-US" dirty="0"/>
-              <a:t>Test coverage/Unit tests</a:t>
-            </a:r>
-          </a:p>
-          <a:p>
             <a:endParaRPr lang="en-US" dirty="0"/>
-          </a:p>
-          <a:p>
-            <a:endParaRPr lang="en-US" dirty="0"/>
-          </a:p>
-          <a:p>
-            <a:r>
-              <a:rPr lang="en-US" dirty="0"/>
-              <a:t>Code review is a learning experience. </a:t>
-            </a:r>
-          </a:p>
-          <a:p>
-            <a:pPr lvl="1"/>
-            <a:r>
-              <a:rPr lang="en-US" dirty="0"/>
-              <a:t>Pay attention to what other people are saying. Ask questions!</a:t>
-            </a:r>
           </a:p>
           <a:p>
             <a:endParaRPr lang="en-US" dirty="0"/>
@@ -12312,7 +14506,7 @@
           <p:cNvPr id="4" name="Slide Number Placeholder 3">
             <a:extLst>
               <a:ext uri="{FF2B5EF4-FFF2-40B4-BE49-F238E27FC236}">
-                <a16:creationId xmlns:a16="http://schemas.microsoft.com/office/drawing/2014/main" id="{0A0DFB07-1E52-DF44-9EFB-08E104C7D221}"/>
+                <a16:creationId xmlns:a16="http://schemas.microsoft.com/office/drawing/2014/main" id="{F53848B6-8F14-D14C-B7A8-04BE8320C7F6}"/>
               </a:ext>
             </a:extLst>
           </p:cNvPr>
@@ -12345,7 +14539,7 @@
     </p:spTree>
     <p:extLst>
       <p:ext uri="{BB962C8B-B14F-4D97-AF65-F5344CB8AC3E}">
-        <p14:creationId xmlns:p14="http://schemas.microsoft.com/office/powerpoint/2010/main" val="541474135"/>
+        <p14:creationId xmlns:p14="http://schemas.microsoft.com/office/powerpoint/2010/main" val="3982632405"/>
       </p:ext>
     </p:extLst>
   </p:cSld>
@@ -12377,7 +14571,7 @@
           <p:cNvPr id="2" name="Title 1">
             <a:extLst>
               <a:ext uri="{FF2B5EF4-FFF2-40B4-BE49-F238E27FC236}">
-                <a16:creationId xmlns:a16="http://schemas.microsoft.com/office/drawing/2014/main" id="{692BC1A3-AAA8-754C-B1FC-787FEDD328E0}"/>
+                <a16:creationId xmlns:a16="http://schemas.microsoft.com/office/drawing/2014/main" id="{A76DF4DB-B2FC-E34C-A1F0-335A48F5D9F2}"/>
               </a:ext>
             </a:extLst>
           </p:cNvPr>
@@ -12395,7 +14589,7 @@
           <a:p>
             <a:r>
               <a:rPr lang="en-US" dirty="0"/>
-              <a:t>Code Review – Questions</a:t>
+              <a:t>Starting the Readme file</a:t>
             </a:r>
           </a:p>
         </p:txBody>
@@ -12405,7 +14599,7 @@
           <p:cNvPr id="3" name="Content Placeholder 2">
             <a:extLst>
               <a:ext uri="{FF2B5EF4-FFF2-40B4-BE49-F238E27FC236}">
-                <a16:creationId xmlns:a16="http://schemas.microsoft.com/office/drawing/2014/main" id="{EB6F0590-BBE1-8C41-8B29-81338FFFE86B}"/>
+                <a16:creationId xmlns:a16="http://schemas.microsoft.com/office/drawing/2014/main" id="{2878E0B6-3191-5F4B-96BB-F86B3D862C62}"/>
               </a:ext>
             </a:extLst>
           </p:cNvPr>
@@ -12421,58 +14615,23 @@
           <a:bodyPr/>
           <a:lstStyle/>
           <a:p>
-            <a:r>
-              <a:rPr lang="en-US" dirty="0"/>
-              <a:t>Does this code accomplish the purpose? </a:t>
-            </a:r>
-          </a:p>
-          <a:p>
             <a:endParaRPr lang="en-US" dirty="0"/>
           </a:p>
           <a:p>
             <a:r>
               <a:rPr lang="en-US" dirty="0"/>
-              <a:t>How would you have solved the problem?</a:t>
-            </a:r>
-          </a:p>
-          <a:p>
+              <a:t>When creating your page/repository make it clear that the project is free/open</a:t>
+            </a:r>
+          </a:p>
+          <a:p>
+            <a:pPr lvl="1"/>
             <a:endParaRPr lang="en-US" dirty="0"/>
           </a:p>
           <a:p>
             <a:r>
               <a:rPr lang="en-US" dirty="0"/>
-              <a:t>You are the devil’s advocate, but be nice</a:t>
-            </a:r>
-          </a:p>
-          <a:p>
-            <a:endParaRPr lang="en-US" dirty="0"/>
-          </a:p>
-          <a:p>
-            <a:r>
-              <a:rPr lang="en-US" dirty="0"/>
-              <a:t>How was the “reading” experience?</a:t>
-            </a:r>
-          </a:p>
-          <a:p>
-            <a:endParaRPr lang="en-US" dirty="0"/>
-          </a:p>
-          <a:p>
-            <a:r>
-              <a:rPr lang="en-US" dirty="0"/>
-              <a:t>Does the code follow to coding guidelines/style? </a:t>
-            </a:r>
-          </a:p>
-          <a:p>
-            <a:endParaRPr lang="en-US" dirty="0"/>
-          </a:p>
-          <a:p>
-            <a:r>
-              <a:rPr lang="en-US" dirty="0"/>
-              <a:t>Does this code introduce the risk of breaking builds?</a:t>
-            </a:r>
-          </a:p>
-          <a:p>
-            <a:endParaRPr lang="en-US" dirty="0"/>
+              <a:t>Create one short paragraph describing the mission of the project</a:t>
+            </a:r>
           </a:p>
         </p:txBody>
       </p:sp>
@@ -12481,7 +14640,7 @@
           <p:cNvPr id="4" name="Slide Number Placeholder 3">
             <a:extLst>
               <a:ext uri="{FF2B5EF4-FFF2-40B4-BE49-F238E27FC236}">
-                <a16:creationId xmlns:a16="http://schemas.microsoft.com/office/drawing/2014/main" id="{344CE819-9600-7D4F-B687-1BFA8F72A12D}"/>
+                <a16:creationId xmlns:a16="http://schemas.microsoft.com/office/drawing/2014/main" id="{3CFE74F1-4323-124C-BB51-9A3B63C3D100}"/>
               </a:ext>
             </a:extLst>
           </p:cNvPr>
@@ -12511,10 +14670,40 @@
           </a:p>
         </p:txBody>
       </p:sp>
+      <p:pic>
+        <p:nvPicPr>
+          <p:cNvPr id="5" name="Picture 4">
+            <a:extLst>
+              <a:ext uri="{FF2B5EF4-FFF2-40B4-BE49-F238E27FC236}">
+                <a16:creationId xmlns:a16="http://schemas.microsoft.com/office/drawing/2014/main" id="{EF793E8F-0F11-644B-A71C-E7F255A56104}"/>
+              </a:ext>
+            </a:extLst>
+          </p:cNvPr>
+          <p:cNvPicPr>
+            <a:picLocks noChangeAspect="1"/>
+          </p:cNvPicPr>
+          <p:nvPr/>
+        </p:nvPicPr>
+        <p:blipFill>
+          <a:blip r:embed="rId2"/>
+          <a:stretch>
+            <a:fillRect/>
+          </a:stretch>
+        </p:blipFill>
+        <p:spPr>
+          <a:xfrm rot="21369116">
+            <a:off x="35946" y="3712863"/>
+            <a:ext cx="9144000" cy="2439463"/>
+          </a:xfrm>
+          <a:prstGeom prst="rect">
+            <a:avLst/>
+          </a:prstGeom>
+        </p:spPr>
+      </p:pic>
     </p:spTree>
     <p:extLst>
       <p:ext uri="{BB962C8B-B14F-4D97-AF65-F5344CB8AC3E}">
-        <p14:creationId xmlns:p14="http://schemas.microsoft.com/office/powerpoint/2010/main" val="3322535010"/>
+        <p14:creationId xmlns:p14="http://schemas.microsoft.com/office/powerpoint/2010/main" val="2456623006"/>
       </p:ext>
     </p:extLst>
   </p:cSld>
@@ -12546,7 +14735,7 @@
           <p:cNvPr id="2" name="Title 1">
             <a:extLst>
               <a:ext uri="{FF2B5EF4-FFF2-40B4-BE49-F238E27FC236}">
-                <a16:creationId xmlns:a16="http://schemas.microsoft.com/office/drawing/2014/main" id="{CD32E4AF-BDDD-274B-AF81-363CF56A6047}"/>
+                <a16:creationId xmlns:a16="http://schemas.microsoft.com/office/drawing/2014/main" id="{105102F4-84C2-3940-9CCD-5198C2CAF8F7}"/>
               </a:ext>
             </a:extLst>
           </p:cNvPr>
@@ -12564,7 +14753,7 @@
           <a:p>
             <a:r>
               <a:rPr lang="en-US" dirty="0"/>
-              <a:t>Code Review – Questions </a:t>
+              <a:t>List the features and Requirements</a:t>
             </a:r>
           </a:p>
         </p:txBody>
@@ -12574,7 +14763,7 @@
           <p:cNvPr id="3" name="Content Placeholder 2">
             <a:extLst>
               <a:ext uri="{FF2B5EF4-FFF2-40B4-BE49-F238E27FC236}">
-                <a16:creationId xmlns:a16="http://schemas.microsoft.com/office/drawing/2014/main" id="{00E71946-2626-1E4C-80B9-D8A72540CC63}"/>
+                <a16:creationId xmlns:a16="http://schemas.microsoft.com/office/drawing/2014/main" id="{43909F27-EE82-0748-AC3C-431BAAB2C282}"/>
               </a:ext>
             </a:extLst>
           </p:cNvPr>
@@ -12590,60 +14779,44 @@
           <a:bodyPr/>
           <a:lstStyle/>
           <a:p>
-            <a:r>
-              <a:rPr lang="en-US" dirty="0"/>
-              <a:t>Does this code break existing tests/builds? (CI)</a:t>
-            </a:r>
-          </a:p>
-          <a:p>
             <a:endParaRPr lang="en-US" dirty="0"/>
           </a:p>
           <a:p>
             <a:r>
               <a:rPr lang="en-US" dirty="0"/>
-              <a:t>Does the code need more tests?</a:t>
+              <a:t>What does this software do?</a:t>
             </a:r>
           </a:p>
           <a:p>
             <a:endParaRPr lang="en-US" dirty="0"/>
           </a:p>
           <a:p>
-            <a:r>
-              <a:rPr lang="en-US" dirty="0"/>
-              <a:t>Was the documentation created/updated?</a:t>
-            </a:r>
-          </a:p>
-          <a:p>
             <a:endParaRPr lang="en-US" dirty="0"/>
           </a:p>
           <a:p>
             <a:r>
               <a:rPr lang="en-US" dirty="0"/>
-              <a:t>Are there security vulnerabilities? </a:t>
+              <a:t>What is planned for it? (Future features)</a:t>
             </a:r>
           </a:p>
           <a:p>
             <a:endParaRPr lang="en-US" dirty="0"/>
           </a:p>
           <a:p>
-            <a:r>
-              <a:rPr lang="en-US" dirty="0"/>
-              <a:t>Is this an efficient way? Any O(n</a:t>
-            </a:r>
-            <a:r>
-              <a:rPr lang="en-US" baseline="30000" dirty="0"/>
-              <a:t>2</a:t>
-            </a:r>
-            <a:r>
-              <a:rPr lang="en-US" dirty="0"/>
-              <a:t>) or worse algorithm?</a:t>
-            </a:r>
-          </a:p>
-          <a:p>
             <a:endParaRPr lang="en-US" dirty="0"/>
           </a:p>
           <a:p>
-            <a:endParaRPr lang="en-US" dirty="0"/>
+            <a:r>
+              <a:rPr lang="en-US" dirty="0"/>
+              <a:t>What do I need to run your project?</a:t>
+            </a:r>
+          </a:p>
+          <a:p>
+            <a:pPr lvl="1"/>
+            <a:r>
+              <a:rPr lang="en-US" dirty="0"/>
+              <a:t>OS, compiler, disk space, etc.</a:t>
+            </a:r>
           </a:p>
         </p:txBody>
       </p:sp>
@@ -12652,7 +14825,7 @@
           <p:cNvPr id="4" name="Slide Number Placeholder 3">
             <a:extLst>
               <a:ext uri="{FF2B5EF4-FFF2-40B4-BE49-F238E27FC236}">
-                <a16:creationId xmlns:a16="http://schemas.microsoft.com/office/drawing/2014/main" id="{AF4DF837-09AD-F84A-80BE-5AE98EFE7CEC}"/>
+                <a16:creationId xmlns:a16="http://schemas.microsoft.com/office/drawing/2014/main" id="{4AB036B7-9398-B142-928D-A8424655C1B4}"/>
               </a:ext>
             </a:extLst>
           </p:cNvPr>
@@ -12685,7 +14858,7 @@
     </p:spTree>
     <p:extLst>
       <p:ext uri="{BB962C8B-B14F-4D97-AF65-F5344CB8AC3E}">
-        <p14:creationId xmlns:p14="http://schemas.microsoft.com/office/powerpoint/2010/main" val="1750041334"/>
+        <p14:creationId xmlns:p14="http://schemas.microsoft.com/office/powerpoint/2010/main" val="1580304124"/>
       </p:ext>
     </p:extLst>
   </p:cSld>
@@ -12717,7 +14890,7 @@
           <p:cNvPr id="2" name="Title 1">
             <a:extLst>
               <a:ext uri="{FF2B5EF4-FFF2-40B4-BE49-F238E27FC236}">
-                <a16:creationId xmlns:a16="http://schemas.microsoft.com/office/drawing/2014/main" id="{E16F7594-59EF-A34D-9CF5-A80CE687D81A}"/>
+                <a16:creationId xmlns:a16="http://schemas.microsoft.com/office/drawing/2014/main" id="{E93B121F-724A-4944-8363-D9A4D3591054}"/>
               </a:ext>
             </a:extLst>
           </p:cNvPr>
@@ -12735,7 +14908,7 @@
           <a:p>
             <a:r>
               <a:rPr lang="en-US" dirty="0"/>
-              <a:t>Writing the Review</a:t>
+              <a:t>Issue Tracker</a:t>
             </a:r>
           </a:p>
         </p:txBody>
@@ -12745,7 +14918,7 @@
           <p:cNvPr id="3" name="Content Placeholder 2">
             <a:extLst>
               <a:ext uri="{FF2B5EF4-FFF2-40B4-BE49-F238E27FC236}">
-                <a16:creationId xmlns:a16="http://schemas.microsoft.com/office/drawing/2014/main" id="{ADFB2FBD-1904-E748-BFA4-14D4690FBFC3}"/>
+                <a16:creationId xmlns:a16="http://schemas.microsoft.com/office/drawing/2014/main" id="{016DB645-4A42-4443-A49F-80ED952CAAA5}"/>
               </a:ext>
             </a:extLst>
           </p:cNvPr>
@@ -12761,53 +14934,52 @@
           <a:bodyPr/>
           <a:lstStyle/>
           <a:p>
-            <a:r>
-              <a:rPr lang="en-US" dirty="0"/>
-              <a:t>Don't make it personal. </a:t>
-            </a:r>
-          </a:p>
-          <a:p>
-            <a:r>
-              <a:rPr lang="en-US" dirty="0"/>
-              <a:t>Be nice</a:t>
-            </a:r>
-          </a:p>
-          <a:p>
-            <a:r>
-              <a:rPr lang="en-US" dirty="0"/>
-              <a:t>Be constructive</a:t>
-            </a:r>
-          </a:p>
-          <a:p>
-            <a:r>
-              <a:rPr lang="en-US" dirty="0"/>
-              <a:t>Be specific</a:t>
-            </a:r>
-          </a:p>
-          <a:p>
-            <a:r>
-              <a:rPr lang="en-US" dirty="0"/>
-              <a:t>Justify your points</a:t>
-            </a:r>
-          </a:p>
-          <a:p>
-            <a:r>
-              <a:rPr lang="en-US" dirty="0"/>
-              <a:t>Ask questions</a:t>
-            </a:r>
+            <a:endParaRPr lang="en-US" dirty="0"/>
+          </a:p>
+          <a:p>
+            <a:r>
+              <a:rPr lang="en-US" dirty="0"/>
+              <a:t>Public issue tracker is needed</a:t>
+            </a:r>
+          </a:p>
+          <a:p>
+            <a:endParaRPr lang="en-US" dirty="0"/>
           </a:p>
           <a:p>
             <a:pPr lvl="1"/>
             <a:r>
               <a:rPr lang="en-US" dirty="0"/>
-              <a:t>why did you do it this way?</a:t>
-            </a:r>
+              <a:t>Report bugs</a:t>
+            </a:r>
+          </a:p>
+          <a:p>
+            <a:endParaRPr lang="en-US" dirty="0"/>
           </a:p>
           <a:p>
             <a:pPr lvl="1"/>
             <a:r>
               <a:rPr lang="en-US" dirty="0"/>
-              <a:t>I'm trying to understand this code, walk me through the options you considered</a:t>
+              <a:t>Check the project activity</a:t>
+            </a:r>
+          </a:p>
+          <a:p>
+            <a:endParaRPr lang="en-US" dirty="0"/>
+          </a:p>
+          <a:p>
+            <a:pPr lvl="1"/>
+            <a:r>
+              <a:rPr lang="en-US" dirty="0"/>
+              <a:t>Contribute</a:t>
+            </a:r>
+          </a:p>
+          <a:p>
+            <a:pPr lvl="1"/>
+            <a:endParaRPr lang="en-US" dirty="0"/>
+          </a:p>
+          <a:p>
+            <a:r>
+              <a:rPr lang="en-US" dirty="0"/>
+              <a:t>Curating the issue tracker is a constant and infinite task</a:t>
             </a:r>
           </a:p>
         </p:txBody>
@@ -12817,7 +14989,7 @@
           <p:cNvPr id="4" name="Slide Number Placeholder 3">
             <a:extLst>
               <a:ext uri="{FF2B5EF4-FFF2-40B4-BE49-F238E27FC236}">
-                <a16:creationId xmlns:a16="http://schemas.microsoft.com/office/drawing/2014/main" id="{14281B10-C1A9-A643-B69A-AD9CAA49F80E}"/>
+                <a16:creationId xmlns:a16="http://schemas.microsoft.com/office/drawing/2014/main" id="{6B9F9F31-DD16-EE49-AB3F-5727466AFEC3}"/>
               </a:ext>
             </a:extLst>
           </p:cNvPr>
@@ -12850,7 +15022,7 @@
     </p:spTree>
     <p:extLst>
       <p:ext uri="{BB962C8B-B14F-4D97-AF65-F5344CB8AC3E}">
-        <p14:creationId xmlns:p14="http://schemas.microsoft.com/office/powerpoint/2010/main" val="2882253685"/>
+        <p14:creationId xmlns:p14="http://schemas.microsoft.com/office/powerpoint/2010/main" val="3826586404"/>
       </p:ext>
     </p:extLst>
   </p:cSld>
@@ -12882,7 +15054,7 @@
           <p:cNvPr id="2" name="Title 1">
             <a:extLst>
               <a:ext uri="{FF2B5EF4-FFF2-40B4-BE49-F238E27FC236}">
-                <a16:creationId xmlns:a16="http://schemas.microsoft.com/office/drawing/2014/main" id="{ECBA4E8F-EBEB-D441-B0E2-9DAAD12CD5BC}"/>
+                <a16:creationId xmlns:a16="http://schemas.microsoft.com/office/drawing/2014/main" id="{AEC96E5E-A920-A64D-84AF-0C8D424CB46A}"/>
               </a:ext>
             </a:extLst>
           </p:cNvPr>
@@ -12900,7 +15072,7 @@
           <a:p>
             <a:r>
               <a:rPr lang="en-US" dirty="0"/>
-              <a:t>Resources and More Resources</a:t>
+              <a:t>Version Control</a:t>
             </a:r>
           </a:p>
         </p:txBody>
@@ -12910,7 +15082,7 @@
           <p:cNvPr id="3" name="Content Placeholder 2">
             <a:extLst>
               <a:ext uri="{FF2B5EF4-FFF2-40B4-BE49-F238E27FC236}">
-                <a16:creationId xmlns:a16="http://schemas.microsoft.com/office/drawing/2014/main" id="{B66AFA59-5AEA-7545-98B0-7CFCD9BD29DF}"/>
+                <a16:creationId xmlns:a16="http://schemas.microsoft.com/office/drawing/2014/main" id="{C9028534-8144-EE4E-9D05-B2804F34FB31}"/>
               </a:ext>
             </a:extLst>
           </p:cNvPr>
@@ -12926,127 +15098,19 @@
           <a:bodyPr/>
           <a:lstStyle/>
           <a:p>
-            <a:r>
-              <a:rPr lang="en-US" dirty="0"/>
-              <a:t>There are many resources out there. These slides are based on some of them</a:t>
+            <a:endParaRPr lang="en-US" dirty="0"/>
+          </a:p>
+          <a:p>
+            <a:r>
+              <a:rPr lang="en-US" dirty="0"/>
+              <a:t>You MUST have your code in a version control system</a:t>
             </a:r>
           </a:p>
           <a:p>
             <a:pPr lvl="1"/>
             <a:r>
               <a:rPr lang="en-US" dirty="0"/>
-              <a:t>https://</a:t>
-            </a:r>
-            <a:r>
-              <a:rPr lang="en-US" dirty="0" err="1"/>
-              <a:t>mtlynch.io</a:t>
-            </a:r>
-            <a:r>
-              <a:rPr lang="en-US" dirty="0"/>
-              <a:t>/human-code-reviews-1/</a:t>
-            </a:r>
-          </a:p>
-          <a:p>
-            <a:pPr lvl="1"/>
-            <a:r>
-              <a:rPr lang="en-US" dirty="0"/>
-              <a:t>https://</a:t>
-            </a:r>
-            <a:r>
-              <a:rPr lang="en-US" dirty="0" err="1"/>
-              <a:t>medium.com</a:t>
-            </a:r>
-            <a:r>
-              <a:rPr lang="en-US" dirty="0"/>
-              <a:t>/</a:t>
-            </a:r>
-            <a:r>
-              <a:rPr lang="en-US" dirty="0" err="1"/>
-              <a:t>palantir</a:t>
-            </a:r>
-            <a:r>
-              <a:rPr lang="en-US" dirty="0"/>
-              <a:t>/code-review-best-practices-19e02780015f</a:t>
-            </a:r>
-          </a:p>
-          <a:p>
-            <a:pPr lvl="1"/>
-            <a:r>
-              <a:rPr lang="en-US" dirty="0"/>
-              <a:t>https://</a:t>
-            </a:r>
-            <a:r>
-              <a:rPr lang="en-US" dirty="0" err="1"/>
-              <a:t>smartbear.com</a:t>
-            </a:r>
-            <a:r>
-              <a:rPr lang="en-US" dirty="0"/>
-              <a:t>/learn/code-review/best-practices-for-peer-code-review/</a:t>
-            </a:r>
-          </a:p>
-          <a:p>
-            <a:pPr lvl="1"/>
-            <a:r>
-              <a:rPr lang="en-US" dirty="0"/>
-              <a:t>https://</a:t>
-            </a:r>
-            <a:r>
-              <a:rPr lang="en-US" dirty="0" err="1"/>
-              <a:t>code.likeagirl.io</a:t>
-            </a:r>
-            <a:r>
-              <a:rPr lang="en-US" dirty="0"/>
-              <a:t>/the-7-steps-to-a-complete-code-review-abdfd39e75f1</a:t>
-            </a:r>
-          </a:p>
-          <a:p>
-            <a:pPr lvl="1"/>
-            <a:r>
-              <a:rPr lang="en-US" dirty="0"/>
-              <a:t>https://</a:t>
-            </a:r>
-            <a:r>
-              <a:rPr lang="en-US" dirty="0" err="1"/>
-              <a:t>towardsdatascience.com</a:t>
-            </a:r>
-            <a:r>
-              <a:rPr lang="en-US" dirty="0"/>
-              <a:t>/teaching-code-review-in-university-courses-using-peer-feedback-5625fe039f2a</a:t>
-            </a:r>
-          </a:p>
-          <a:p>
-            <a:pPr lvl="1"/>
-            <a:r>
-              <a:rPr lang="en-US" dirty="0"/>
-              <a:t>https://</a:t>
-            </a:r>
-            <a:r>
-              <a:rPr lang="en-US" dirty="0" err="1"/>
-              <a:t>en.wikipedia.org</a:t>
-            </a:r>
-            <a:r>
-              <a:rPr lang="en-US" dirty="0"/>
-              <a:t>/wiki/</a:t>
-            </a:r>
-            <a:r>
-              <a:rPr lang="en-US" dirty="0" err="1"/>
-              <a:t>Code_review</a:t>
-            </a:r>
-            <a:endParaRPr lang="en-US" dirty="0"/>
-          </a:p>
-          <a:p>
-            <a:pPr lvl="1"/>
-            <a:r>
-              <a:rPr lang="en-US" dirty="0"/>
-              <a:t>http://</a:t>
-            </a:r>
-            <a:r>
-              <a:rPr lang="en-US" dirty="0" err="1"/>
-              <a:t>web.mit.edu</a:t>
-            </a:r>
-            <a:r>
-              <a:rPr lang="en-US" dirty="0"/>
-              <a:t>/6.005/www/fa15/classes/04-code-review/</a:t>
+              <a:t>For GitHub it is easy, we know</a:t>
             </a:r>
           </a:p>
           <a:p>
@@ -13054,8 +15118,31 @@
             <a:endParaRPr lang="en-US" dirty="0"/>
           </a:p>
           <a:p>
+            <a:r>
+              <a:rPr lang="en-US" dirty="0"/>
+              <a:t>It is not only about having it</a:t>
+            </a:r>
+          </a:p>
+          <a:p>
             <a:pPr lvl="1"/>
-            <a:endParaRPr lang="en-US" dirty="0"/>
+            <a:r>
+              <a:rPr lang="en-US" dirty="0"/>
+              <a:t>Maintaining</a:t>
+            </a:r>
+          </a:p>
+          <a:p>
+            <a:pPr lvl="1"/>
+            <a:r>
+              <a:rPr lang="en-US" dirty="0"/>
+              <a:t>Receiving/reviewing code</a:t>
+            </a:r>
+          </a:p>
+          <a:p>
+            <a:pPr lvl="1"/>
+            <a:r>
+              <a:rPr lang="en-US" dirty="0"/>
+              <a:t>Use the same way as ANYONE needs to use</a:t>
+            </a:r>
           </a:p>
         </p:txBody>
       </p:sp>
@@ -13064,7 +15151,7 @@
           <p:cNvPr id="4" name="Slide Number Placeholder 3">
             <a:extLst>
               <a:ext uri="{FF2B5EF4-FFF2-40B4-BE49-F238E27FC236}">
-                <a16:creationId xmlns:a16="http://schemas.microsoft.com/office/drawing/2014/main" id="{D1EBF3F6-7BA1-844E-A4EB-00162DA15969}"/>
+                <a16:creationId xmlns:a16="http://schemas.microsoft.com/office/drawing/2014/main" id="{68AD4E93-8290-1540-9816-02120266029E}"/>
               </a:ext>
             </a:extLst>
           </p:cNvPr>
@@ -13097,7 +15184,7 @@
     </p:spTree>
     <p:extLst>
       <p:ext uri="{BB962C8B-B14F-4D97-AF65-F5344CB8AC3E}">
-        <p14:creationId xmlns:p14="http://schemas.microsoft.com/office/powerpoint/2010/main" val="2457484607"/>
+        <p14:creationId xmlns:p14="http://schemas.microsoft.com/office/powerpoint/2010/main" val="728894681"/>
       </p:ext>
     </p:extLst>
   </p:cSld>

</xml_diff>